<commit_message>
Complete presentation and fix some docx problem
</commit_message>
<xml_diff>
--- a/text/Масштабирование_вычислительных_мощностей.pptx
+++ b/text/Масштабирование_вычислительных_мощностей.pptx
@@ -5,20 +5,25 @@
     <p:sldMasterId id="2147483648" r:id="rId1"/>
   </p:sldMasterIdLst>
   <p:notesMasterIdLst>
-    <p:notesMasterId r:id="rId13"/>
+    <p:notesMasterId r:id="rId18"/>
   </p:notesMasterIdLst>
   <p:sldIdLst>
     <p:sldId id="256" r:id="rId2"/>
     <p:sldId id="262" r:id="rId3"/>
-    <p:sldId id="257" r:id="rId4"/>
-    <p:sldId id="266" r:id="rId5"/>
-    <p:sldId id="258" r:id="rId6"/>
-    <p:sldId id="263" r:id="rId7"/>
-    <p:sldId id="259" r:id="rId8"/>
-    <p:sldId id="265" r:id="rId9"/>
-    <p:sldId id="260" r:id="rId10"/>
-    <p:sldId id="264" r:id="rId11"/>
-    <p:sldId id="261" r:id="rId12"/>
+    <p:sldId id="268" r:id="rId4"/>
+    <p:sldId id="257" r:id="rId5"/>
+    <p:sldId id="267" r:id="rId6"/>
+    <p:sldId id="258" r:id="rId7"/>
+    <p:sldId id="263" r:id="rId8"/>
+    <p:sldId id="271" r:id="rId9"/>
+    <p:sldId id="265" r:id="rId10"/>
+    <p:sldId id="259" r:id="rId11"/>
+    <p:sldId id="272" r:id="rId12"/>
+    <p:sldId id="260" r:id="rId13"/>
+    <p:sldId id="264" r:id="rId14"/>
+    <p:sldId id="269" r:id="rId15"/>
+    <p:sldId id="261" r:id="rId16"/>
+    <p:sldId id="270" r:id="rId17"/>
   </p:sldIdLst>
   <p:sldSz cx="12192000" cy="6858000"/>
   <p:notesSz cx="6858000" cy="9144000"/>
@@ -207,7 +212,7 @@
           <a:p>
             <a:fld id="{4FF0A2C1-A709-4C91-B7B4-3BE4737BAE6D}" type="datetimeFigureOut">
               <a:rPr lang="ru-RU" smtClean="0"/>
-              <a:t>21.05.2024</a:t>
+              <a:t>22.05.2024</a:t>
             </a:fld>
             <a:endParaRPr lang="ru-RU"/>
           </a:p>
@@ -539,7 +544,7 @@
           <a:p>
             <a:fld id="{9D692571-0117-48ED-8BD5-9DD3857D5772}" type="slidenum">
               <a:rPr lang="ru-RU" smtClean="0"/>
-              <a:t>9</a:t>
+              <a:t>12</a:t>
             </a:fld>
             <a:endParaRPr lang="ru-RU"/>
           </a:p>
@@ -705,7 +710,7 @@
           <a:p>
             <a:fld id="{2EDAAAB9-FE22-481C-980A-43397F66870D}" type="datetimeFigureOut">
               <a:rPr lang="ru-RU" smtClean="0"/>
-              <a:t>21.05.2024</a:t>
+              <a:t>22.05.2024</a:t>
             </a:fld>
             <a:endParaRPr lang="ru-RU"/>
           </a:p>
@@ -903,7 +908,7 @@
           <a:p>
             <a:fld id="{2EDAAAB9-FE22-481C-980A-43397F66870D}" type="datetimeFigureOut">
               <a:rPr lang="ru-RU" smtClean="0"/>
-              <a:t>21.05.2024</a:t>
+              <a:t>22.05.2024</a:t>
             </a:fld>
             <a:endParaRPr lang="ru-RU"/>
           </a:p>
@@ -1111,7 +1116,7 @@
           <a:p>
             <a:fld id="{2EDAAAB9-FE22-481C-980A-43397F66870D}" type="datetimeFigureOut">
               <a:rPr lang="ru-RU" smtClean="0"/>
-              <a:t>21.05.2024</a:t>
+              <a:t>22.05.2024</a:t>
             </a:fld>
             <a:endParaRPr lang="ru-RU"/>
           </a:p>
@@ -1309,7 +1314,7 @@
           <a:p>
             <a:fld id="{2EDAAAB9-FE22-481C-980A-43397F66870D}" type="datetimeFigureOut">
               <a:rPr lang="ru-RU" smtClean="0"/>
-              <a:t>21.05.2024</a:t>
+              <a:t>22.05.2024</a:t>
             </a:fld>
             <a:endParaRPr lang="ru-RU"/>
           </a:p>
@@ -1584,7 +1589,7 @@
           <a:p>
             <a:fld id="{2EDAAAB9-FE22-481C-980A-43397F66870D}" type="datetimeFigureOut">
               <a:rPr lang="ru-RU" smtClean="0"/>
-              <a:t>21.05.2024</a:t>
+              <a:t>22.05.2024</a:t>
             </a:fld>
             <a:endParaRPr lang="ru-RU"/>
           </a:p>
@@ -1849,7 +1854,7 @@
           <a:p>
             <a:fld id="{2EDAAAB9-FE22-481C-980A-43397F66870D}" type="datetimeFigureOut">
               <a:rPr lang="ru-RU" smtClean="0"/>
-              <a:t>21.05.2024</a:t>
+              <a:t>22.05.2024</a:t>
             </a:fld>
             <a:endParaRPr lang="ru-RU"/>
           </a:p>
@@ -2261,7 +2266,7 @@
           <a:p>
             <a:fld id="{2EDAAAB9-FE22-481C-980A-43397F66870D}" type="datetimeFigureOut">
               <a:rPr lang="ru-RU" smtClean="0"/>
-              <a:t>21.05.2024</a:t>
+              <a:t>22.05.2024</a:t>
             </a:fld>
             <a:endParaRPr lang="ru-RU"/>
           </a:p>
@@ -2402,7 +2407,7 @@
           <a:p>
             <a:fld id="{2EDAAAB9-FE22-481C-980A-43397F66870D}" type="datetimeFigureOut">
               <a:rPr lang="ru-RU" smtClean="0"/>
-              <a:t>21.05.2024</a:t>
+              <a:t>22.05.2024</a:t>
             </a:fld>
             <a:endParaRPr lang="ru-RU"/>
           </a:p>
@@ -2515,7 +2520,7 @@
           <a:p>
             <a:fld id="{2EDAAAB9-FE22-481C-980A-43397F66870D}" type="datetimeFigureOut">
               <a:rPr lang="ru-RU" smtClean="0"/>
-              <a:t>21.05.2024</a:t>
+              <a:t>22.05.2024</a:t>
             </a:fld>
             <a:endParaRPr lang="ru-RU"/>
           </a:p>
@@ -2826,7 +2831,7 @@
           <a:p>
             <a:fld id="{2EDAAAB9-FE22-481C-980A-43397F66870D}" type="datetimeFigureOut">
               <a:rPr lang="ru-RU" smtClean="0"/>
-              <a:t>21.05.2024</a:t>
+              <a:t>22.05.2024</a:t>
             </a:fld>
             <a:endParaRPr lang="ru-RU"/>
           </a:p>
@@ -3114,7 +3119,7 @@
           <a:p>
             <a:fld id="{2EDAAAB9-FE22-481C-980A-43397F66870D}" type="datetimeFigureOut">
               <a:rPr lang="ru-RU" smtClean="0"/>
-              <a:t>21.05.2024</a:t>
+              <a:t>22.05.2024</a:t>
             </a:fld>
             <a:endParaRPr lang="ru-RU"/>
           </a:p>
@@ -3355,7 +3360,7 @@
           <a:p>
             <a:fld id="{2EDAAAB9-FE22-481C-980A-43397F66870D}" type="datetimeFigureOut">
               <a:rPr lang="ru-RU" smtClean="0"/>
-              <a:t>21.05.2024</a:t>
+              <a:t>22.05.2024</a:t>
             </a:fld>
             <a:endParaRPr lang="ru-RU"/>
           </a:p>
@@ -3788,56 +3793,61 @@
             <p:ph type="ctrTitle"/>
           </p:nvPr>
         </p:nvSpPr>
-        <p:spPr/>
-        <p:txBody>
-          <a:bodyPr>
-            <a:normAutofit fontScale="90000"/>
-          </a:bodyPr>
-          <a:lstStyle/>
-          <a:p>
-            <a:r>
-              <a:rPr lang="ru-RU" sz="4000" dirty="0"/>
-              <a:t>Масштабирование вычислительных мощностей распределенной автоматизированной системы мониторинга расхода топлива в транспортной компании</a:t>
-            </a:r>
-          </a:p>
-        </p:txBody>
-      </p:sp>
-      <p:sp>
-        <p:nvSpPr>
-          <p:cNvPr id="3" name="Подзаголовок 2">
-            <a:extLst>
-              <a:ext uri="{FF2B5EF4-FFF2-40B4-BE49-F238E27FC236}">
-                <a16:creationId xmlns:a16="http://schemas.microsoft.com/office/drawing/2014/main" id="{09838FCE-42DE-4D82-846F-484F69FAF04B}"/>
-              </a:ext>
-            </a:extLst>
-          </p:cNvPr>
-          <p:cNvSpPr>
-            <a:spLocks noGrp="1"/>
-          </p:cNvSpPr>
-          <p:nvPr>
-            <p:ph type="subTitle" idx="1"/>
-          </p:nvPr>
-        </p:nvSpPr>
         <p:spPr>
           <a:xfrm>
-            <a:off x="6890157" y="4079875"/>
-            <a:ext cx="4572000" cy="1655762"/>
+            <a:off x="1524000" y="696913"/>
+            <a:ext cx="9144000" cy="2387600"/>
           </a:xfrm>
         </p:spPr>
         <p:txBody>
           <a:bodyPr>
-            <a:normAutofit fontScale="92500" lnSpcReduction="10000"/>
+            <a:normAutofit/>
           </a:bodyPr>
           <a:lstStyle/>
           <a:p>
+            <a:r>
+              <a:rPr lang="ru-RU" sz="4000" dirty="0"/>
+              <a:t>Масштабирование вычислительных мощностей автоматизированной системы мониторинга расхода топлива</a:t>
+            </a:r>
+          </a:p>
+        </p:txBody>
+      </p:sp>
+      <p:sp>
+        <p:nvSpPr>
+          <p:cNvPr id="3" name="Подзаголовок 2">
+            <a:extLst>
+              <a:ext uri="{FF2B5EF4-FFF2-40B4-BE49-F238E27FC236}">
+                <a16:creationId xmlns:a16="http://schemas.microsoft.com/office/drawing/2014/main" id="{09838FCE-42DE-4D82-846F-484F69FAF04B}"/>
+              </a:ext>
+            </a:extLst>
+          </p:cNvPr>
+          <p:cNvSpPr>
+            <a:spLocks noGrp="1"/>
+          </p:cNvSpPr>
+          <p:nvPr>
+            <p:ph type="subTitle" idx="1"/>
+          </p:nvPr>
+        </p:nvSpPr>
+        <p:spPr>
+          <a:xfrm>
+            <a:off x="5003800" y="4873625"/>
+            <a:ext cx="6871107" cy="1655762"/>
+          </a:xfrm>
+        </p:spPr>
+        <p:txBody>
+          <a:bodyPr>
+            <a:normAutofit fontScale="92500"/>
+          </a:bodyPr>
+          <a:lstStyle/>
+          <a:p>
             <a:pPr algn="l"/>
             <a:r>
               <a:rPr lang="ru-RU" dirty="0"/>
-              <a:t>Автор</a:t>
+              <a:t>Выполнил студент гр. М8О-410б-20</a:t>
             </a:r>
             <a:r>
               <a:rPr lang="en-US" dirty="0"/>
-              <a:t>: </a:t>
+              <a:t> </a:t>
             </a:r>
             <a:r>
               <a:rPr lang="ru-RU" dirty="0"/>
@@ -3848,13 +3858,6 @@
             <a:pPr algn="l"/>
             <a:r>
               <a:rPr lang="ru-RU" dirty="0"/>
-              <a:t>М8О-410б-20</a:t>
-            </a:r>
-          </a:p>
-          <a:p>
-            <a:pPr algn="l"/>
-            <a:r>
-              <a:rPr lang="ru-RU" dirty="0"/>
               <a:t>Научный руководитель</a:t>
             </a:r>
             <a:r>
@@ -3866,7 +3869,7 @@
             <a:pPr algn="l"/>
             <a:r>
               <a:rPr lang="ru-RU" dirty="0"/>
-              <a:t>Чернова Татьяна Александровна</a:t>
+              <a:t>д.т.н., проф. каф. 806 Чернова Татьяна Александровна</a:t>
             </a:r>
           </a:p>
         </p:txBody>
@@ -3906,7 +3909,7 @@
           <p:cNvPr id="2" name="Заголовок 1">
             <a:extLst>
               <a:ext uri="{FF2B5EF4-FFF2-40B4-BE49-F238E27FC236}">
-                <a16:creationId xmlns:a16="http://schemas.microsoft.com/office/drawing/2014/main" id="{55173A97-C98A-41DD-9582-D52F421BAB1B}"/>
+                <a16:creationId xmlns:a16="http://schemas.microsoft.com/office/drawing/2014/main" id="{BE1713C2-2CC5-4530-9F81-E74C1EFE8ECE}"/>
               </a:ext>
             </a:extLst>
           </p:cNvPr>
@@ -3924,7 +3927,7 @@
           <a:p>
             <a:r>
               <a:rPr lang="ru-RU" dirty="0"/>
-              <a:t>Выводы</a:t>
+              <a:t>Образ результата</a:t>
             </a:r>
           </a:p>
         </p:txBody>
@@ -3934,7 +3937,7 @@
           <p:cNvPr id="3" name="Объект 2">
             <a:extLst>
               <a:ext uri="{FF2B5EF4-FFF2-40B4-BE49-F238E27FC236}">
-                <a16:creationId xmlns:a16="http://schemas.microsoft.com/office/drawing/2014/main" id="{25BD81CB-F304-445E-8C48-0481F007A025}"/>
+                <a16:creationId xmlns:a16="http://schemas.microsoft.com/office/drawing/2014/main" id="{54A60F72-9D9E-431B-AB80-4668CBF9C4EE}"/>
               </a:ext>
             </a:extLst>
           </p:cNvPr>
@@ -3945,22 +3948,81 @@
             <p:ph idx="1"/>
           </p:nvPr>
         </p:nvSpPr>
-        <p:spPr/>
-        <p:txBody>
-          <a:bodyPr/>
+        <p:spPr>
+          <a:xfrm>
+            <a:off x="838200" y="1955800"/>
+            <a:ext cx="9480550" cy="4132263"/>
+          </a:xfrm>
+        </p:spPr>
+        <p:txBody>
+          <a:bodyPr>
+            <a:normAutofit fontScale="92500" lnSpcReduction="10000"/>
+          </a:bodyPr>
           <a:lstStyle/>
           <a:p>
             <a:r>
               <a:rPr lang="ru-RU" dirty="0"/>
-              <a:t>Рассматривая работу программного модуля на практическом примере функционирования автоматизированной системы мониторинга расхода топлива, можем видеть что при перегрузке система наращивает свои мощности и продолжает работать в штатном режиме, а в случае недогруза, уменьшает их, что обеспечивает оптимальное количество рабочих узлов. Это экономит ресурсы и, следственно, затраты на них.</a:t>
-            </a:r>
-          </a:p>
-        </p:txBody>
-      </p:sp>
+              <a:t>На основе анализа задач балансировки нагрузки в распределенных вычислительных системах спроектирована, реализована в виде программного модуля и размещена в облачном сервисе автоматизированная вычислительная система мониторинга и контроля расхода топлива на примере топливо-снабжающей организации.</a:t>
+            </a:r>
+            <a:endParaRPr lang="en-US" dirty="0"/>
+          </a:p>
+          <a:p>
+            <a:r>
+              <a:rPr lang="ru-RU" dirty="0"/>
+              <a:t>В результате работы программного модуля продемонстрированы опции облачной платформы по горизонтальному масштабированию приложения. Показано, что результаты балансировки существенно зависят от колебаний интенсивности входного потока запросов.</a:t>
+            </a:r>
+          </a:p>
+          <a:p>
+            <a:pPr marL="0" indent="0">
+              <a:buNone/>
+            </a:pPr>
+            <a:endParaRPr lang="ru-RU" dirty="0"/>
+          </a:p>
+        </p:txBody>
+      </p:sp>
+      <p:pic>
+        <p:nvPicPr>
+          <p:cNvPr id="5" name="Рисунок 4">
+            <a:extLst>
+              <a:ext uri="{FF2B5EF4-FFF2-40B4-BE49-F238E27FC236}">
+                <a16:creationId xmlns:a16="http://schemas.microsoft.com/office/drawing/2014/main" id="{55E8719F-2ECE-EE05-0388-B364D318AC14}"/>
+              </a:ext>
+            </a:extLst>
+          </p:cNvPr>
+          <p:cNvPicPr>
+            <a:picLocks noChangeAspect="1"/>
+          </p:cNvPicPr>
+          <p:nvPr/>
+        </p:nvPicPr>
+        <p:blipFill>
+          <a:blip r:embed="rId2">
+            <a:extLst>
+              <a:ext uri="{28A0092B-C50C-407E-A947-70E740481C1C}">
+                <a14:useLocalDpi xmlns:a14="http://schemas.microsoft.com/office/drawing/2010/main" val="0"/>
+              </a:ext>
+              <a:ext uri="{96DAC541-7B7A-43D3-8B79-37D633B846F1}">
+                <asvg:svgBlip xmlns:asvg="http://schemas.microsoft.com/office/drawing/2016/SVG/main" r:embed="rId3"/>
+              </a:ext>
+            </a:extLst>
+          </a:blip>
+          <a:stretch>
+            <a:fillRect/>
+          </a:stretch>
+        </p:blipFill>
+        <p:spPr>
+          <a:xfrm>
+            <a:off x="9899650" y="241300"/>
+            <a:ext cx="1758950" cy="1758950"/>
+          </a:xfrm>
+          <a:prstGeom prst="rect">
+            <a:avLst/>
+          </a:prstGeom>
+        </p:spPr>
+      </p:pic>
     </p:spTree>
     <p:extLst>
       <p:ext uri="{BB962C8B-B14F-4D97-AF65-F5344CB8AC3E}">
-        <p14:creationId xmlns:p14="http://schemas.microsoft.com/office/powerpoint/2010/main" val="3761155850"/>
+        <p14:creationId xmlns:p14="http://schemas.microsoft.com/office/powerpoint/2010/main" val="2076769733"/>
       </p:ext>
     </p:extLst>
   </p:cSld>
@@ -3992,6 +4054,1113 @@
           <p:cNvPr id="2" name="Заголовок 1">
             <a:extLst>
               <a:ext uri="{FF2B5EF4-FFF2-40B4-BE49-F238E27FC236}">
+                <a16:creationId xmlns:a16="http://schemas.microsoft.com/office/drawing/2014/main" id="{F94D0907-2794-F529-C70D-F0DAE219170A}"/>
+              </a:ext>
+            </a:extLst>
+          </p:cNvPr>
+          <p:cNvSpPr>
+            <a:spLocks noGrp="1"/>
+          </p:cNvSpPr>
+          <p:nvPr>
+            <p:ph type="title"/>
+          </p:nvPr>
+        </p:nvSpPr>
+        <p:spPr/>
+        <p:txBody>
+          <a:bodyPr/>
+          <a:lstStyle/>
+          <a:p>
+            <a:r>
+              <a:rPr lang="ru-RU" dirty="0"/>
+              <a:t>Внешний вид </a:t>
+            </a:r>
+            <a:r>
+              <a:rPr lang="en-US" dirty="0"/>
+              <a:t>Web-</a:t>
+            </a:r>
+            <a:r>
+              <a:rPr lang="ru-RU" dirty="0"/>
+              <a:t>консоли</a:t>
+            </a:r>
+          </a:p>
+        </p:txBody>
+      </p:sp>
+      <p:pic>
+        <p:nvPicPr>
+          <p:cNvPr id="5" name="Объект 4">
+            <a:extLst>
+              <a:ext uri="{FF2B5EF4-FFF2-40B4-BE49-F238E27FC236}">
+                <a16:creationId xmlns:a16="http://schemas.microsoft.com/office/drawing/2014/main" id="{464A66BA-767D-4435-81F2-6FDB5496409A}"/>
+              </a:ext>
+            </a:extLst>
+          </p:cNvPr>
+          <p:cNvPicPr>
+            <a:picLocks noGrp="1" noChangeAspect="1"/>
+          </p:cNvPicPr>
+          <p:nvPr>
+            <p:ph idx="1"/>
+          </p:nvPr>
+        </p:nvPicPr>
+        <p:blipFill>
+          <a:blip r:embed="rId2"/>
+          <a:stretch>
+            <a:fillRect/>
+          </a:stretch>
+        </p:blipFill>
+        <p:spPr>
+          <a:xfrm>
+            <a:off x="2042223" y="1690688"/>
+            <a:ext cx="6911277" cy="4929279"/>
+          </a:xfrm>
+        </p:spPr>
+      </p:pic>
+      <p:pic>
+        <p:nvPicPr>
+          <p:cNvPr id="7" name="Рисунок 6">
+            <a:extLst>
+              <a:ext uri="{FF2B5EF4-FFF2-40B4-BE49-F238E27FC236}">
+                <a16:creationId xmlns:a16="http://schemas.microsoft.com/office/drawing/2014/main" id="{7C12FD1F-F46F-C7E7-5A98-409F6A4067F1}"/>
+              </a:ext>
+            </a:extLst>
+          </p:cNvPr>
+          <p:cNvPicPr>
+            <a:picLocks noChangeAspect="1"/>
+          </p:cNvPicPr>
+          <p:nvPr/>
+        </p:nvPicPr>
+        <p:blipFill>
+          <a:blip r:embed="rId3">
+            <a:extLst>
+              <a:ext uri="{28A0092B-C50C-407E-A947-70E740481C1C}">
+                <a14:useLocalDpi xmlns:a14="http://schemas.microsoft.com/office/drawing/2010/main" val="0"/>
+              </a:ext>
+              <a:ext uri="{96DAC541-7B7A-43D3-8B79-37D633B846F1}">
+                <asvg:svgBlip xmlns:asvg="http://schemas.microsoft.com/office/drawing/2016/SVG/main" r:embed="rId4"/>
+              </a:ext>
+            </a:extLst>
+          </a:blip>
+          <a:stretch>
+            <a:fillRect/>
+          </a:stretch>
+        </p:blipFill>
+        <p:spPr>
+          <a:xfrm>
+            <a:off x="10274300" y="427831"/>
+            <a:ext cx="1200150" cy="1200150"/>
+          </a:xfrm>
+          <a:prstGeom prst="rect">
+            <a:avLst/>
+          </a:prstGeom>
+        </p:spPr>
+      </p:pic>
+    </p:spTree>
+    <p:extLst>
+      <p:ext uri="{BB962C8B-B14F-4D97-AF65-F5344CB8AC3E}">
+        <p14:creationId xmlns:p14="http://schemas.microsoft.com/office/powerpoint/2010/main" val="2323462520"/>
+      </p:ext>
+    </p:extLst>
+  </p:cSld>
+  <p:clrMapOvr>
+    <a:masterClrMapping/>
+  </p:clrMapOvr>
+</p:sld>
+</file>
+
+<file path=ppt/slides/slide12.xml><?xml version="1.0" encoding="utf-8"?>
+<p:sld xmlns:a="http://schemas.openxmlformats.org/drawingml/2006/main" xmlns:r="http://schemas.openxmlformats.org/officeDocument/2006/relationships" xmlns:p="http://schemas.openxmlformats.org/presentationml/2006/main">
+  <p:cSld>
+    <p:spTree>
+      <p:nvGrpSpPr>
+        <p:cNvPr id="1" name=""/>
+        <p:cNvGrpSpPr/>
+        <p:nvPr/>
+      </p:nvGrpSpPr>
+      <p:grpSpPr>
+        <a:xfrm>
+          <a:off x="0" y="0"/>
+          <a:ext cx="0" cy="0"/>
+          <a:chOff x="0" y="0"/>
+          <a:chExt cx="0" cy="0"/>
+        </a:xfrm>
+      </p:grpSpPr>
+      <p:sp>
+        <p:nvSpPr>
+          <p:cNvPr id="2" name="Заголовок 1">
+            <a:extLst>
+              <a:ext uri="{FF2B5EF4-FFF2-40B4-BE49-F238E27FC236}">
+                <a16:creationId xmlns:a16="http://schemas.microsoft.com/office/drawing/2014/main" id="{D88DF4E3-A826-45F6-AEED-43A21C74A84D}"/>
+              </a:ext>
+            </a:extLst>
+          </p:cNvPr>
+          <p:cNvSpPr>
+            <a:spLocks noGrp="1"/>
+          </p:cNvSpPr>
+          <p:nvPr>
+            <p:ph type="title"/>
+          </p:nvPr>
+        </p:nvSpPr>
+        <p:spPr/>
+        <p:txBody>
+          <a:bodyPr/>
+          <a:lstStyle/>
+          <a:p>
+            <a:r>
+              <a:rPr lang="ru-RU" dirty="0"/>
+              <a:t>Стек</a:t>
+            </a:r>
+            <a:r>
+              <a:rPr lang="en-US" dirty="0"/>
+              <a:t> </a:t>
+            </a:r>
+            <a:r>
+              <a:rPr lang="ru-RU" dirty="0"/>
+              <a:t>технологий</a:t>
+            </a:r>
+          </a:p>
+        </p:txBody>
+      </p:sp>
+      <p:sp>
+        <p:nvSpPr>
+          <p:cNvPr id="3" name="Объект 2">
+            <a:extLst>
+              <a:ext uri="{FF2B5EF4-FFF2-40B4-BE49-F238E27FC236}">
+                <a16:creationId xmlns:a16="http://schemas.microsoft.com/office/drawing/2014/main" id="{5E77244A-50C3-4FD7-97A2-B5CE43B886A4}"/>
+              </a:ext>
+            </a:extLst>
+          </p:cNvPr>
+          <p:cNvSpPr>
+            <a:spLocks noGrp="1"/>
+          </p:cNvSpPr>
+          <p:nvPr>
+            <p:ph idx="1"/>
+          </p:nvPr>
+        </p:nvSpPr>
+        <p:spPr/>
+        <p:txBody>
+          <a:bodyPr>
+            <a:normAutofit fontScale="92500" lnSpcReduction="20000"/>
+          </a:bodyPr>
+          <a:lstStyle/>
+          <a:p>
+            <a:r>
+              <a:rPr lang="ru-RU" dirty="0"/>
+              <a:t>Язык программирования</a:t>
+            </a:r>
+            <a:r>
+              <a:rPr lang="en-US" dirty="0"/>
+              <a:t> Python3.1</a:t>
+            </a:r>
+            <a:r>
+              <a:rPr lang="ru-RU" dirty="0"/>
+              <a:t>2</a:t>
+            </a:r>
+            <a:r>
+              <a:rPr lang="en-US" dirty="0"/>
+              <a:t>;</a:t>
+            </a:r>
+            <a:endParaRPr lang="ru-RU" dirty="0"/>
+          </a:p>
+          <a:p>
+            <a:r>
+              <a:rPr lang="ru-RU" dirty="0"/>
+              <a:t>Облачная платформа</a:t>
+            </a:r>
+            <a:r>
+              <a:rPr lang="en-US" dirty="0"/>
+              <a:t> Yandex Cloud;</a:t>
+            </a:r>
+            <a:endParaRPr lang="ru-RU" i="1" dirty="0">
+              <a:highlight>
+                <a:srgbClr val="FFFF00"/>
+              </a:highlight>
+            </a:endParaRPr>
+          </a:p>
+          <a:p>
+            <a:r>
+              <a:rPr lang="en-US" dirty="0"/>
+              <a:t>Kubernetes; </a:t>
+            </a:r>
+          </a:p>
+          <a:p>
+            <a:r>
+              <a:rPr lang="en-US" dirty="0"/>
+              <a:t>Docker;</a:t>
+            </a:r>
+          </a:p>
+          <a:p>
+            <a:r>
+              <a:rPr lang="en-US" dirty="0"/>
+              <a:t>Prometheus.</a:t>
+            </a:r>
+          </a:p>
+          <a:p>
+            <a:r>
+              <a:rPr lang="en-US" dirty="0"/>
+              <a:t>MUI;</a:t>
+            </a:r>
+          </a:p>
+          <a:p>
+            <a:r>
+              <a:rPr lang="en-US" dirty="0" err="1"/>
+              <a:t>NextJS</a:t>
+            </a:r>
+            <a:r>
+              <a:rPr lang="en-US" dirty="0"/>
+              <a:t>;</a:t>
+            </a:r>
+            <a:endParaRPr lang="ru-RU" dirty="0"/>
+          </a:p>
+          <a:p>
+            <a:r>
+              <a:rPr lang="en-US" dirty="0"/>
+              <a:t>TypeScript;</a:t>
+            </a:r>
+          </a:p>
+          <a:p>
+            <a:r>
+              <a:rPr lang="en-US" dirty="0"/>
+              <a:t>Yarn;</a:t>
+            </a:r>
+          </a:p>
+          <a:p>
+            <a:r>
+              <a:rPr lang="en-US" dirty="0"/>
+              <a:t>Nginx.</a:t>
+            </a:r>
+          </a:p>
+          <a:p>
+            <a:endParaRPr lang="ru-RU" dirty="0"/>
+          </a:p>
+        </p:txBody>
+      </p:sp>
+      <p:sp>
+        <p:nvSpPr>
+          <p:cNvPr id="4" name="AutoShape 2" descr="File:C-sharplogo">
+            <a:extLst>
+              <a:ext uri="{FF2B5EF4-FFF2-40B4-BE49-F238E27FC236}">
+                <a16:creationId xmlns:a16="http://schemas.microsoft.com/office/drawing/2014/main" id="{194C774E-43FC-72E0-5533-B97429DE84DD}"/>
+              </a:ext>
+            </a:extLst>
+          </p:cNvPr>
+          <p:cNvSpPr>
+            <a:spLocks noChangeAspect="1" noChangeArrowheads="1"/>
+          </p:cNvSpPr>
+          <p:nvPr/>
+        </p:nvSpPr>
+        <p:spPr bwMode="auto">
+          <a:xfrm>
+            <a:off x="5943600" y="3276600"/>
+            <a:ext cx="304800" cy="304800"/>
+          </a:xfrm>
+          <a:prstGeom prst="rect">
+            <a:avLst/>
+          </a:prstGeom>
+          <a:noFill/>
+          <a:extLst>
+            <a:ext uri="{909E8E84-426E-40DD-AFC4-6F175D3DCCD1}">
+              <a14:hiddenFill xmlns:a14="http://schemas.microsoft.com/office/drawing/2010/main">
+                <a:solidFill>
+                  <a:srgbClr val="FFFFFF"/>
+                </a:solidFill>
+              </a14:hiddenFill>
+            </a:ext>
+          </a:extLst>
+        </p:spPr>
+        <p:txBody>
+          <a:bodyPr vert="horz" wrap="square" lIns="91440" tIns="45720" rIns="91440" bIns="45720" numCol="1" anchor="t" anchorCtr="0" compatLnSpc="1">
+            <a:prstTxWarp prst="textNoShape">
+              <a:avLst/>
+            </a:prstTxWarp>
+          </a:bodyPr>
+          <a:lstStyle/>
+          <a:p>
+            <a:endParaRPr lang="ru-RU"/>
+          </a:p>
+        </p:txBody>
+      </p:sp>
+      <p:pic>
+        <p:nvPicPr>
+          <p:cNvPr id="12" name="Рисунок 11">
+            <a:extLst>
+              <a:ext uri="{FF2B5EF4-FFF2-40B4-BE49-F238E27FC236}">
+                <a16:creationId xmlns:a16="http://schemas.microsoft.com/office/drawing/2014/main" id="{1D71AA61-93EE-6FB1-D4DA-18B3E43EC650}"/>
+              </a:ext>
+            </a:extLst>
+          </p:cNvPr>
+          <p:cNvPicPr>
+            <a:picLocks noChangeAspect="1"/>
+          </p:cNvPicPr>
+          <p:nvPr/>
+        </p:nvPicPr>
+        <p:blipFill>
+          <a:blip r:embed="rId3">
+            <a:extLst>
+              <a:ext uri="{28A0092B-C50C-407E-A947-70E740481C1C}">
+                <a14:useLocalDpi xmlns:a14="http://schemas.microsoft.com/office/drawing/2010/main" val="0"/>
+              </a:ext>
+              <a:ext uri="{96DAC541-7B7A-43D3-8B79-37D633B846F1}">
+                <asvg:svgBlip xmlns:asvg="http://schemas.microsoft.com/office/drawing/2016/SVG/main" r:embed="rId4"/>
+              </a:ext>
+            </a:extLst>
+          </a:blip>
+          <a:stretch>
+            <a:fillRect/>
+          </a:stretch>
+        </p:blipFill>
+        <p:spPr>
+          <a:xfrm>
+            <a:off x="7082080" y="2170123"/>
+            <a:ext cx="2689801" cy="402214"/>
+          </a:xfrm>
+          <a:prstGeom prst="rect">
+            <a:avLst/>
+          </a:prstGeom>
+        </p:spPr>
+      </p:pic>
+      <p:pic>
+        <p:nvPicPr>
+          <p:cNvPr id="9" name="Рисунок 8">
+            <a:extLst>
+              <a:ext uri="{FF2B5EF4-FFF2-40B4-BE49-F238E27FC236}">
+                <a16:creationId xmlns:a16="http://schemas.microsoft.com/office/drawing/2014/main" id="{4CEF2C5C-DB14-8E1C-3465-E44B3661EB62}"/>
+              </a:ext>
+            </a:extLst>
+          </p:cNvPr>
+          <p:cNvPicPr>
+            <a:picLocks noChangeAspect="1"/>
+          </p:cNvPicPr>
+          <p:nvPr/>
+        </p:nvPicPr>
+        <p:blipFill>
+          <a:blip r:embed="rId5">
+            <a:extLst>
+              <a:ext uri="{28A0092B-C50C-407E-A947-70E740481C1C}">
+                <a14:useLocalDpi xmlns:a14="http://schemas.microsoft.com/office/drawing/2010/main" val="0"/>
+              </a:ext>
+              <a:ext uri="{96DAC541-7B7A-43D3-8B79-37D633B846F1}">
+                <asvg:svgBlip xmlns:asvg="http://schemas.microsoft.com/office/drawing/2016/SVG/main" r:embed="rId6"/>
+              </a:ext>
+            </a:extLst>
+          </a:blip>
+          <a:stretch>
+            <a:fillRect/>
+          </a:stretch>
+        </p:blipFill>
+        <p:spPr>
+          <a:xfrm>
+            <a:off x="7077173" y="1825626"/>
+            <a:ext cx="313832" cy="313832"/>
+          </a:xfrm>
+          <a:prstGeom prst="rect">
+            <a:avLst/>
+          </a:prstGeom>
+        </p:spPr>
+      </p:pic>
+      <p:pic>
+        <p:nvPicPr>
+          <p:cNvPr id="11" name="Рисунок 10">
+            <a:extLst>
+              <a:ext uri="{FF2B5EF4-FFF2-40B4-BE49-F238E27FC236}">
+                <a16:creationId xmlns:a16="http://schemas.microsoft.com/office/drawing/2014/main" id="{4DC66C89-5063-5431-0B27-F887373095BB}"/>
+              </a:ext>
+            </a:extLst>
+          </p:cNvPr>
+          <p:cNvPicPr>
+            <a:picLocks noChangeAspect="1"/>
+          </p:cNvPicPr>
+          <p:nvPr/>
+        </p:nvPicPr>
+        <p:blipFill>
+          <a:blip r:embed="rId7">
+            <a:extLst>
+              <a:ext uri="{28A0092B-C50C-407E-A947-70E740481C1C}">
+                <a14:useLocalDpi xmlns:a14="http://schemas.microsoft.com/office/drawing/2010/main" val="0"/>
+              </a:ext>
+              <a:ext uri="{96DAC541-7B7A-43D3-8B79-37D633B846F1}">
+                <asvg:svgBlip xmlns:asvg="http://schemas.microsoft.com/office/drawing/2016/SVG/main" r:embed="rId8"/>
+              </a:ext>
+            </a:extLst>
+          </a:blip>
+          <a:stretch>
+            <a:fillRect/>
+          </a:stretch>
+        </p:blipFill>
+        <p:spPr>
+          <a:xfrm>
+            <a:off x="7082080" y="2603003"/>
+            <a:ext cx="337990" cy="337990"/>
+          </a:xfrm>
+          <a:prstGeom prst="rect">
+            <a:avLst/>
+          </a:prstGeom>
+        </p:spPr>
+      </p:pic>
+      <p:pic>
+        <p:nvPicPr>
+          <p:cNvPr id="15" name="Рисунок 14">
+            <a:extLst>
+              <a:ext uri="{FF2B5EF4-FFF2-40B4-BE49-F238E27FC236}">
+                <a16:creationId xmlns:a16="http://schemas.microsoft.com/office/drawing/2014/main" id="{7B4A03FE-B6E4-D0D0-10D5-23FD2F5FB59F}"/>
+              </a:ext>
+            </a:extLst>
+          </p:cNvPr>
+          <p:cNvPicPr>
+            <a:picLocks noChangeAspect="1"/>
+          </p:cNvPicPr>
+          <p:nvPr/>
+        </p:nvPicPr>
+        <p:blipFill>
+          <a:blip r:embed="rId9">
+            <a:extLst>
+              <a:ext uri="{28A0092B-C50C-407E-A947-70E740481C1C}">
+                <a14:useLocalDpi xmlns:a14="http://schemas.microsoft.com/office/drawing/2010/main" val="0"/>
+              </a:ext>
+              <a:ext uri="{96DAC541-7B7A-43D3-8B79-37D633B846F1}">
+                <asvg:svgBlip xmlns:asvg="http://schemas.microsoft.com/office/drawing/2016/SVG/main" r:embed="rId10"/>
+              </a:ext>
+            </a:extLst>
+          </a:blip>
+          <a:stretch>
+            <a:fillRect/>
+          </a:stretch>
+        </p:blipFill>
+        <p:spPr>
+          <a:xfrm>
+            <a:off x="7077173" y="4166545"/>
+            <a:ext cx="304801" cy="304801"/>
+          </a:xfrm>
+          <a:prstGeom prst="rect">
+            <a:avLst/>
+          </a:prstGeom>
+        </p:spPr>
+      </p:pic>
+      <p:pic>
+        <p:nvPicPr>
+          <p:cNvPr id="17" name="Рисунок 16">
+            <a:extLst>
+              <a:ext uri="{FF2B5EF4-FFF2-40B4-BE49-F238E27FC236}">
+                <a16:creationId xmlns:a16="http://schemas.microsoft.com/office/drawing/2014/main" id="{B079D645-29E9-2972-5A74-C913EB28C6AC}"/>
+              </a:ext>
+            </a:extLst>
+          </p:cNvPr>
+          <p:cNvPicPr>
+            <a:picLocks noChangeAspect="1"/>
+          </p:cNvPicPr>
+          <p:nvPr/>
+        </p:nvPicPr>
+        <p:blipFill>
+          <a:blip r:embed="rId11">
+            <a:extLst>
+              <a:ext uri="{28A0092B-C50C-407E-A947-70E740481C1C}">
+                <a14:useLocalDpi xmlns:a14="http://schemas.microsoft.com/office/drawing/2010/main" val="0"/>
+              </a:ext>
+              <a:ext uri="{96DAC541-7B7A-43D3-8B79-37D633B846F1}">
+                <asvg:svgBlip xmlns:asvg="http://schemas.microsoft.com/office/drawing/2016/SVG/main" r:embed="rId12"/>
+              </a:ext>
+            </a:extLst>
+          </a:blip>
+          <a:stretch>
+            <a:fillRect/>
+          </a:stretch>
+        </p:blipFill>
+        <p:spPr>
+          <a:xfrm>
+            <a:off x="7086205" y="3376665"/>
+            <a:ext cx="304800" cy="304800"/>
+          </a:xfrm>
+          <a:prstGeom prst="rect">
+            <a:avLst/>
+          </a:prstGeom>
+        </p:spPr>
+      </p:pic>
+      <p:pic>
+        <p:nvPicPr>
+          <p:cNvPr id="19" name="Рисунок 18">
+            <a:extLst>
+              <a:ext uri="{FF2B5EF4-FFF2-40B4-BE49-F238E27FC236}">
+                <a16:creationId xmlns:a16="http://schemas.microsoft.com/office/drawing/2014/main" id="{10E59A1E-B21E-F900-0B80-2DB3DE372DC5}"/>
+              </a:ext>
+            </a:extLst>
+          </p:cNvPr>
+          <p:cNvPicPr>
+            <a:picLocks noChangeAspect="1"/>
+          </p:cNvPicPr>
+          <p:nvPr/>
+        </p:nvPicPr>
+        <p:blipFill>
+          <a:blip r:embed="rId13">
+            <a:extLst>
+              <a:ext uri="{28A0092B-C50C-407E-A947-70E740481C1C}">
+                <a14:useLocalDpi xmlns:a14="http://schemas.microsoft.com/office/drawing/2010/main" val="0"/>
+              </a:ext>
+              <a:ext uri="{96DAC541-7B7A-43D3-8B79-37D633B846F1}">
+                <asvg:svgBlip xmlns:asvg="http://schemas.microsoft.com/office/drawing/2016/SVG/main" r:embed="rId14"/>
+              </a:ext>
+            </a:extLst>
+          </a:blip>
+          <a:stretch>
+            <a:fillRect/>
+          </a:stretch>
+        </p:blipFill>
+        <p:spPr>
+          <a:xfrm>
+            <a:off x="7082080" y="2988806"/>
+            <a:ext cx="337990" cy="337990"/>
+          </a:xfrm>
+          <a:prstGeom prst="rect">
+            <a:avLst/>
+          </a:prstGeom>
+        </p:spPr>
+      </p:pic>
+      <p:pic>
+        <p:nvPicPr>
+          <p:cNvPr id="21" name="Рисунок 20">
+            <a:extLst>
+              <a:ext uri="{FF2B5EF4-FFF2-40B4-BE49-F238E27FC236}">
+                <a16:creationId xmlns:a16="http://schemas.microsoft.com/office/drawing/2014/main" id="{941E23F6-9BAB-6FCB-4806-8D05FEC594A1}"/>
+              </a:ext>
+            </a:extLst>
+          </p:cNvPr>
+          <p:cNvPicPr>
+            <a:picLocks noChangeAspect="1"/>
+          </p:cNvPicPr>
+          <p:nvPr/>
+        </p:nvPicPr>
+        <p:blipFill>
+          <a:blip r:embed="rId15">
+            <a:extLst>
+              <a:ext uri="{28A0092B-C50C-407E-A947-70E740481C1C}">
+                <a14:useLocalDpi xmlns:a14="http://schemas.microsoft.com/office/drawing/2010/main" val="0"/>
+              </a:ext>
+              <a:ext uri="{96DAC541-7B7A-43D3-8B79-37D633B846F1}">
+                <asvg:svgBlip xmlns:asvg="http://schemas.microsoft.com/office/drawing/2016/SVG/main" r:embed="rId16"/>
+              </a:ext>
+            </a:extLst>
+          </a:blip>
+          <a:stretch>
+            <a:fillRect/>
+          </a:stretch>
+        </p:blipFill>
+        <p:spPr>
+          <a:xfrm>
+            <a:off x="7082080" y="3811876"/>
+            <a:ext cx="312213" cy="312213"/>
+          </a:xfrm>
+          <a:prstGeom prst="rect">
+            <a:avLst/>
+          </a:prstGeom>
+        </p:spPr>
+      </p:pic>
+      <p:pic>
+        <p:nvPicPr>
+          <p:cNvPr id="25" name="Рисунок 24">
+            <a:extLst>
+              <a:ext uri="{FF2B5EF4-FFF2-40B4-BE49-F238E27FC236}">
+                <a16:creationId xmlns:a16="http://schemas.microsoft.com/office/drawing/2014/main" id="{FB4B29B2-AFC8-8CCD-0926-D6001206F364}"/>
+              </a:ext>
+            </a:extLst>
+          </p:cNvPr>
+          <p:cNvPicPr>
+            <a:picLocks noChangeAspect="1"/>
+          </p:cNvPicPr>
+          <p:nvPr/>
+        </p:nvPicPr>
+        <p:blipFill>
+          <a:blip r:embed="rId17">
+            <a:extLst>
+              <a:ext uri="{28A0092B-C50C-407E-A947-70E740481C1C}">
+                <a14:useLocalDpi xmlns:a14="http://schemas.microsoft.com/office/drawing/2010/main" val="0"/>
+              </a:ext>
+              <a:ext uri="{96DAC541-7B7A-43D3-8B79-37D633B846F1}">
+                <asvg:svgBlip xmlns:asvg="http://schemas.microsoft.com/office/drawing/2016/SVG/main" r:embed="rId18"/>
+              </a:ext>
+            </a:extLst>
+          </a:blip>
+          <a:stretch>
+            <a:fillRect/>
+          </a:stretch>
+        </p:blipFill>
+        <p:spPr>
+          <a:xfrm>
+            <a:off x="7077173" y="5384684"/>
+            <a:ext cx="362082" cy="362082"/>
+          </a:xfrm>
+          <a:prstGeom prst="rect">
+            <a:avLst/>
+          </a:prstGeom>
+        </p:spPr>
+      </p:pic>
+      <p:pic>
+        <p:nvPicPr>
+          <p:cNvPr id="6" name="Рисунок 5">
+            <a:extLst>
+              <a:ext uri="{FF2B5EF4-FFF2-40B4-BE49-F238E27FC236}">
+                <a16:creationId xmlns:a16="http://schemas.microsoft.com/office/drawing/2014/main" id="{B36B246F-7FCE-FDBE-1ED7-E8BF89807422}"/>
+              </a:ext>
+            </a:extLst>
+          </p:cNvPr>
+          <p:cNvPicPr>
+            <a:picLocks noChangeAspect="1"/>
+          </p:cNvPicPr>
+          <p:nvPr/>
+        </p:nvPicPr>
+        <p:blipFill>
+          <a:blip r:embed="rId19">
+            <a:extLst>
+              <a:ext uri="{28A0092B-C50C-407E-A947-70E740481C1C}">
+                <a14:useLocalDpi xmlns:a14="http://schemas.microsoft.com/office/drawing/2010/main" val="0"/>
+              </a:ext>
+              <a:ext uri="{96DAC541-7B7A-43D3-8B79-37D633B846F1}">
+                <asvg:svgBlip xmlns:asvg="http://schemas.microsoft.com/office/drawing/2016/SVG/main" r:embed="rId20"/>
+              </a:ext>
+            </a:extLst>
+          </a:blip>
+          <a:stretch>
+            <a:fillRect/>
+          </a:stretch>
+        </p:blipFill>
+        <p:spPr>
+          <a:xfrm>
+            <a:off x="7086205" y="4602216"/>
+            <a:ext cx="312214" cy="312214"/>
+          </a:xfrm>
+          <a:prstGeom prst="rect">
+            <a:avLst/>
+          </a:prstGeom>
+        </p:spPr>
+      </p:pic>
+      <p:pic>
+        <p:nvPicPr>
+          <p:cNvPr id="8" name="Рисунок 7">
+            <a:extLst>
+              <a:ext uri="{FF2B5EF4-FFF2-40B4-BE49-F238E27FC236}">
+                <a16:creationId xmlns:a16="http://schemas.microsoft.com/office/drawing/2014/main" id="{FED1446C-5E3C-4400-CDDA-71CE05208C4A}"/>
+              </a:ext>
+            </a:extLst>
+          </p:cNvPr>
+          <p:cNvPicPr>
+            <a:picLocks noChangeAspect="1"/>
+          </p:cNvPicPr>
+          <p:nvPr/>
+        </p:nvPicPr>
+        <p:blipFill>
+          <a:blip r:embed="rId21">
+            <a:extLst>
+              <a:ext uri="{28A0092B-C50C-407E-A947-70E740481C1C}">
+                <a14:useLocalDpi xmlns:a14="http://schemas.microsoft.com/office/drawing/2010/main" val="0"/>
+              </a:ext>
+              <a:ext uri="{96DAC541-7B7A-43D3-8B79-37D633B846F1}">
+                <asvg:svgBlip xmlns:asvg="http://schemas.microsoft.com/office/drawing/2016/SVG/main" r:embed="rId22"/>
+              </a:ext>
+            </a:extLst>
+          </a:blip>
+          <a:stretch>
+            <a:fillRect/>
+          </a:stretch>
+        </p:blipFill>
+        <p:spPr>
+          <a:xfrm>
+            <a:off x="7086205" y="4963838"/>
+            <a:ext cx="365125" cy="365125"/>
+          </a:xfrm>
+          <a:prstGeom prst="rect">
+            <a:avLst/>
+          </a:prstGeom>
+        </p:spPr>
+      </p:pic>
+      <p:pic>
+        <p:nvPicPr>
+          <p:cNvPr id="13" name="Рисунок 12">
+            <a:extLst>
+              <a:ext uri="{FF2B5EF4-FFF2-40B4-BE49-F238E27FC236}">
+                <a16:creationId xmlns:a16="http://schemas.microsoft.com/office/drawing/2014/main" id="{4C88D755-62F7-6454-04BF-132084EF6BA7}"/>
+              </a:ext>
+            </a:extLst>
+          </p:cNvPr>
+          <p:cNvPicPr>
+            <a:picLocks noChangeAspect="1"/>
+          </p:cNvPicPr>
+          <p:nvPr/>
+        </p:nvPicPr>
+        <p:blipFill>
+          <a:blip r:embed="rId23">
+            <a:extLst>
+              <a:ext uri="{28A0092B-C50C-407E-A947-70E740481C1C}">
+                <a14:useLocalDpi xmlns:a14="http://schemas.microsoft.com/office/drawing/2010/main" val="0"/>
+              </a:ext>
+              <a:ext uri="{96DAC541-7B7A-43D3-8B79-37D633B846F1}">
+                <asvg:svgBlip xmlns:asvg="http://schemas.microsoft.com/office/drawing/2016/SVG/main" r:embed="rId24"/>
+              </a:ext>
+            </a:extLst>
+          </a:blip>
+          <a:stretch>
+            <a:fillRect/>
+          </a:stretch>
+        </p:blipFill>
+        <p:spPr>
+          <a:xfrm>
+            <a:off x="10091738" y="365124"/>
+            <a:ext cx="1325562" cy="1325562"/>
+          </a:xfrm>
+          <a:prstGeom prst="rect">
+            <a:avLst/>
+          </a:prstGeom>
+        </p:spPr>
+      </p:pic>
+    </p:spTree>
+    <p:extLst>
+      <p:ext uri="{BB962C8B-B14F-4D97-AF65-F5344CB8AC3E}">
+        <p14:creationId xmlns:p14="http://schemas.microsoft.com/office/powerpoint/2010/main" val="3208699259"/>
+      </p:ext>
+    </p:extLst>
+  </p:cSld>
+  <p:clrMapOvr>
+    <a:masterClrMapping/>
+  </p:clrMapOvr>
+</p:sld>
+</file>
+
+<file path=ppt/slides/slide13.xml><?xml version="1.0" encoding="utf-8"?>
+<p:sld xmlns:a="http://schemas.openxmlformats.org/drawingml/2006/main" xmlns:r="http://schemas.openxmlformats.org/officeDocument/2006/relationships" xmlns:p="http://schemas.openxmlformats.org/presentationml/2006/main">
+  <p:cSld>
+    <p:spTree>
+      <p:nvGrpSpPr>
+        <p:cNvPr id="1" name=""/>
+        <p:cNvGrpSpPr/>
+        <p:nvPr/>
+      </p:nvGrpSpPr>
+      <p:grpSpPr>
+        <a:xfrm>
+          <a:off x="0" y="0"/>
+          <a:ext cx="0" cy="0"/>
+          <a:chOff x="0" y="0"/>
+          <a:chExt cx="0" cy="0"/>
+        </a:xfrm>
+      </p:grpSpPr>
+      <p:sp>
+        <p:nvSpPr>
+          <p:cNvPr id="2" name="Заголовок 1">
+            <a:extLst>
+              <a:ext uri="{FF2B5EF4-FFF2-40B4-BE49-F238E27FC236}">
+                <a16:creationId xmlns:a16="http://schemas.microsoft.com/office/drawing/2014/main" id="{55173A97-C98A-41DD-9582-D52F421BAB1B}"/>
+              </a:ext>
+            </a:extLst>
+          </p:cNvPr>
+          <p:cNvSpPr>
+            <a:spLocks noGrp="1"/>
+          </p:cNvSpPr>
+          <p:nvPr>
+            <p:ph type="title"/>
+          </p:nvPr>
+        </p:nvSpPr>
+        <p:spPr/>
+        <p:txBody>
+          <a:bodyPr/>
+          <a:lstStyle/>
+          <a:p>
+            <a:r>
+              <a:rPr lang="ru-RU" dirty="0"/>
+              <a:t>Выводы</a:t>
+            </a:r>
+          </a:p>
+        </p:txBody>
+      </p:sp>
+      <p:sp>
+        <p:nvSpPr>
+          <p:cNvPr id="3" name="Объект 2">
+            <a:extLst>
+              <a:ext uri="{FF2B5EF4-FFF2-40B4-BE49-F238E27FC236}">
+                <a16:creationId xmlns:a16="http://schemas.microsoft.com/office/drawing/2014/main" id="{25BD81CB-F304-445E-8C48-0481F007A025}"/>
+              </a:ext>
+            </a:extLst>
+          </p:cNvPr>
+          <p:cNvSpPr>
+            <a:spLocks noGrp="1"/>
+          </p:cNvSpPr>
+          <p:nvPr>
+            <p:ph idx="1"/>
+          </p:nvPr>
+        </p:nvSpPr>
+        <p:spPr>
+          <a:xfrm>
+            <a:off x="838200" y="1825625"/>
+            <a:ext cx="8509000" cy="4351338"/>
+          </a:xfrm>
+        </p:spPr>
+        <p:txBody>
+          <a:bodyPr>
+            <a:normAutofit fontScale="77500" lnSpcReduction="20000"/>
+          </a:bodyPr>
+          <a:lstStyle/>
+          <a:p>
+            <a:pPr marL="514350" indent="-514350">
+              <a:buFont typeface="+mj-lt"/>
+              <a:buAutoNum type="arabicPeriod"/>
+            </a:pPr>
+            <a:r>
+              <a:rPr lang="ru-RU" dirty="0"/>
+              <a:t>Использование облачных технологий существенно упрощает развертывание и сопровождение динамически </a:t>
+            </a:r>
+            <a:r>
+              <a:rPr lang="ru-RU" dirty="0" err="1"/>
+              <a:t>масштабирующихся</a:t>
+            </a:r>
+            <a:r>
+              <a:rPr lang="ru-RU" dirty="0"/>
+              <a:t> программных систем</a:t>
+            </a:r>
+            <a:r>
+              <a:rPr lang="en-US" dirty="0"/>
+              <a:t>;</a:t>
+            </a:r>
+          </a:p>
+          <a:p>
+            <a:pPr marL="514350" indent="-514350">
+              <a:buFont typeface="+mj-lt"/>
+              <a:buAutoNum type="arabicPeriod"/>
+            </a:pPr>
+            <a:r>
+              <a:rPr lang="ru-RU" dirty="0"/>
+              <a:t>Использование контролирующего модуля позволит экономить средства, выделенные на эксплуатацию полезной нагрузки, за счет оптимизация выделенных на нее мощностей</a:t>
+            </a:r>
+            <a:r>
+              <a:rPr lang="en-US" dirty="0"/>
+              <a:t>;</a:t>
+            </a:r>
+          </a:p>
+          <a:p>
+            <a:pPr marL="514350" indent="-514350">
+              <a:buFont typeface="+mj-lt"/>
+              <a:buAutoNum type="arabicPeriod"/>
+            </a:pPr>
+            <a:r>
+              <a:rPr lang="ru-RU" dirty="0"/>
+              <a:t>Открытый исходный код предоставляет возможность дальнейшей модификации и развития сторонними разработчиками.</a:t>
+            </a:r>
+          </a:p>
+          <a:p>
+            <a:pPr marL="0" indent="0">
+              <a:buNone/>
+            </a:pPr>
+            <a:endParaRPr lang="ru-RU" dirty="0"/>
+          </a:p>
+          <a:p>
+            <a:pPr marL="0" indent="0">
+              <a:buNone/>
+            </a:pPr>
+            <a:r>
+              <a:rPr lang="ru-RU" dirty="0"/>
+              <a:t>Главным преимуществом использования решения является значительная экономия средств в течение всего срока использования программной и системы, и, что немаловажно, существенного уменьшения репутационных рисков, вызываемых отказом обслуживания пользователей, в следствие перегрузки системы.</a:t>
+            </a:r>
+          </a:p>
+        </p:txBody>
+      </p:sp>
+      <p:pic>
+        <p:nvPicPr>
+          <p:cNvPr id="5" name="Рисунок 4">
+            <a:extLst>
+              <a:ext uri="{FF2B5EF4-FFF2-40B4-BE49-F238E27FC236}">
+                <a16:creationId xmlns:a16="http://schemas.microsoft.com/office/drawing/2014/main" id="{7C03A11D-A695-66FD-6837-045EF3771137}"/>
+              </a:ext>
+            </a:extLst>
+          </p:cNvPr>
+          <p:cNvPicPr>
+            <a:picLocks noChangeAspect="1"/>
+          </p:cNvPicPr>
+          <p:nvPr/>
+        </p:nvPicPr>
+        <p:blipFill>
+          <a:blip r:embed="rId2">
+            <a:extLst>
+              <a:ext uri="{28A0092B-C50C-407E-A947-70E740481C1C}">
+                <a14:useLocalDpi xmlns:a14="http://schemas.microsoft.com/office/drawing/2010/main" val="0"/>
+              </a:ext>
+              <a:ext uri="{96DAC541-7B7A-43D3-8B79-37D633B846F1}">
+                <asvg:svgBlip xmlns:asvg="http://schemas.microsoft.com/office/drawing/2016/SVG/main" r:embed="rId3"/>
+              </a:ext>
+            </a:extLst>
+          </a:blip>
+          <a:stretch>
+            <a:fillRect/>
+          </a:stretch>
+        </p:blipFill>
+        <p:spPr>
+          <a:xfrm>
+            <a:off x="10129043" y="365125"/>
+            <a:ext cx="1360488" cy="1360488"/>
+          </a:xfrm>
+          <a:prstGeom prst="rect">
+            <a:avLst/>
+          </a:prstGeom>
+        </p:spPr>
+      </p:pic>
+    </p:spTree>
+    <p:extLst>
+      <p:ext uri="{BB962C8B-B14F-4D97-AF65-F5344CB8AC3E}">
+        <p14:creationId xmlns:p14="http://schemas.microsoft.com/office/powerpoint/2010/main" val="3761155850"/>
+      </p:ext>
+    </p:extLst>
+  </p:cSld>
+  <p:clrMapOvr>
+    <a:masterClrMapping/>
+  </p:clrMapOvr>
+</p:sld>
+</file>
+
+<file path=ppt/slides/slide14.xml><?xml version="1.0" encoding="utf-8"?>
+<p:sld xmlns:a="http://schemas.openxmlformats.org/drawingml/2006/main" xmlns:r="http://schemas.openxmlformats.org/officeDocument/2006/relationships" xmlns:p="http://schemas.openxmlformats.org/presentationml/2006/main">
+  <p:cSld>
+    <p:spTree>
+      <p:nvGrpSpPr>
+        <p:cNvPr id="1" name=""/>
+        <p:cNvGrpSpPr/>
+        <p:nvPr/>
+      </p:nvGrpSpPr>
+      <p:grpSpPr>
+        <a:xfrm>
+          <a:off x="0" y="0"/>
+          <a:ext cx="0" cy="0"/>
+          <a:chOff x="0" y="0"/>
+          <a:chExt cx="0" cy="0"/>
+        </a:xfrm>
+      </p:grpSpPr>
+      <p:sp>
+        <p:nvSpPr>
+          <p:cNvPr id="2" name="Заголовок 1">
+            <a:extLst>
+              <a:ext uri="{FF2B5EF4-FFF2-40B4-BE49-F238E27FC236}">
+                <a16:creationId xmlns:a16="http://schemas.microsoft.com/office/drawing/2014/main" id="{93D11FEF-80D5-7432-2E78-CC3181575706}"/>
+              </a:ext>
+            </a:extLst>
+          </p:cNvPr>
+          <p:cNvSpPr>
+            <a:spLocks noGrp="1"/>
+          </p:cNvSpPr>
+          <p:nvPr>
+            <p:ph type="title"/>
+          </p:nvPr>
+        </p:nvSpPr>
+        <p:spPr/>
+        <p:txBody>
+          <a:bodyPr/>
+          <a:lstStyle/>
+          <a:p>
+            <a:r>
+              <a:rPr lang="ru-RU" dirty="0"/>
+              <a:t>Апробация</a:t>
+            </a:r>
+          </a:p>
+        </p:txBody>
+      </p:sp>
+      <p:sp>
+        <p:nvSpPr>
+          <p:cNvPr id="3" name="Объект 2">
+            <a:extLst>
+              <a:ext uri="{FF2B5EF4-FFF2-40B4-BE49-F238E27FC236}">
+                <a16:creationId xmlns:a16="http://schemas.microsoft.com/office/drawing/2014/main" id="{D2B6BBE1-1025-67DC-1624-999BC854C8DD}"/>
+              </a:ext>
+            </a:extLst>
+          </p:cNvPr>
+          <p:cNvSpPr>
+            <a:spLocks noGrp="1"/>
+          </p:cNvSpPr>
+          <p:nvPr>
+            <p:ph idx="1"/>
+          </p:nvPr>
+        </p:nvSpPr>
+        <p:spPr/>
+        <p:txBody>
+          <a:bodyPr>
+            <a:normAutofit/>
+          </a:bodyPr>
+          <a:lstStyle/>
+          <a:p>
+            <a:r>
+              <a:rPr lang="ru-RU" sz="2000" dirty="0">
+                <a:highlight>
+                  <a:srgbClr val="FFFFFF"/>
+                </a:highlight>
+              </a:rPr>
+              <a:t>Забелин Н.А. МАСШТАБИРОВАНИЕ ВЫЧИСЛИТЕЛЬНЫХ МОЩНОСТЕЙ РАСПРЕДЕЛЕННОЙ АВТОМАТИЗИРОВАННОЙ СИСТЕМЫ МОНИТОРИНГА РАСХОДА ТОПЛИВА В ТРАНСПОРТНОЙ КОМПАНИИ // CLXXXVIII Международная научно-практическая конференция «Научное сообщество студентов: МЕЖДИСЦИПЛИНАРНЫЕ ИССЛЕДОВАНИЯ». - Новосибирск, 2024.</a:t>
+            </a:r>
+            <a:endParaRPr lang="ru-RU" sz="2000" dirty="0"/>
+          </a:p>
+        </p:txBody>
+      </p:sp>
+      <p:pic>
+        <p:nvPicPr>
+          <p:cNvPr id="5" name="Рисунок 4">
+            <a:extLst>
+              <a:ext uri="{FF2B5EF4-FFF2-40B4-BE49-F238E27FC236}">
+                <a16:creationId xmlns:a16="http://schemas.microsoft.com/office/drawing/2014/main" id="{29D27CAF-3CD1-13A6-4988-8E7663B71178}"/>
+              </a:ext>
+            </a:extLst>
+          </p:cNvPr>
+          <p:cNvPicPr>
+            <a:picLocks noChangeAspect="1"/>
+          </p:cNvPicPr>
+          <p:nvPr/>
+        </p:nvPicPr>
+        <p:blipFill>
+          <a:blip r:embed="rId2">
+            <a:extLst>
+              <a:ext uri="{28A0092B-C50C-407E-A947-70E740481C1C}">
+                <a14:useLocalDpi xmlns:a14="http://schemas.microsoft.com/office/drawing/2010/main" val="0"/>
+              </a:ext>
+              <a:ext uri="{96DAC541-7B7A-43D3-8B79-37D633B846F1}">
+                <asvg:svgBlip xmlns:asvg="http://schemas.microsoft.com/office/drawing/2016/SVG/main" r:embed="rId3"/>
+              </a:ext>
+            </a:extLst>
+          </a:blip>
+          <a:stretch>
+            <a:fillRect/>
+          </a:stretch>
+        </p:blipFill>
+        <p:spPr>
+          <a:xfrm>
+            <a:off x="10028237" y="230188"/>
+            <a:ext cx="1325563" cy="1325563"/>
+          </a:xfrm>
+          <a:prstGeom prst="rect">
+            <a:avLst/>
+          </a:prstGeom>
+        </p:spPr>
+      </p:pic>
+    </p:spTree>
+    <p:extLst>
+      <p:ext uri="{BB962C8B-B14F-4D97-AF65-F5344CB8AC3E}">
+        <p14:creationId xmlns:p14="http://schemas.microsoft.com/office/powerpoint/2010/main" val="4003138476"/>
+      </p:ext>
+    </p:extLst>
+  </p:cSld>
+  <p:clrMapOvr>
+    <a:masterClrMapping/>
+  </p:clrMapOvr>
+</p:sld>
+</file>
+
+<file path=ppt/slides/slide15.xml><?xml version="1.0" encoding="utf-8"?>
+<p:sld xmlns:a="http://schemas.openxmlformats.org/drawingml/2006/main" xmlns:r="http://schemas.openxmlformats.org/officeDocument/2006/relationships" xmlns:p="http://schemas.openxmlformats.org/presentationml/2006/main">
+  <p:cSld>
+    <p:spTree>
+      <p:nvGrpSpPr>
+        <p:cNvPr id="1" name=""/>
+        <p:cNvGrpSpPr/>
+        <p:nvPr/>
+      </p:nvGrpSpPr>
+      <p:grpSpPr>
+        <a:xfrm>
+          <a:off x="0" y="0"/>
+          <a:ext cx="0" cy="0"/>
+          <a:chOff x="0" y="0"/>
+          <a:chExt cx="0" cy="0"/>
+        </a:xfrm>
+      </p:grpSpPr>
+      <p:sp>
+        <p:nvSpPr>
+          <p:cNvPr id="2" name="Заголовок 1">
+            <a:extLst>
+              <a:ext uri="{FF2B5EF4-FFF2-40B4-BE49-F238E27FC236}">
                 <a16:creationId xmlns:a16="http://schemas.microsoft.com/office/drawing/2014/main" id="{9EA7B2D2-55D1-486E-B068-65B4976650E9}"/>
               </a:ext>
             </a:extLst>
@@ -4031,7 +5200,12 @@
             <p:ph idx="1"/>
           </p:nvPr>
         </p:nvSpPr>
-        <p:spPr/>
+        <p:spPr>
+          <a:xfrm>
+            <a:off x="838200" y="1825625"/>
+            <a:ext cx="9258300" cy="4351338"/>
+          </a:xfrm>
+        </p:spPr>
         <p:txBody>
           <a:bodyPr>
             <a:normAutofit/>
@@ -4098,10 +5272,113 @@
           </a:p>
         </p:txBody>
       </p:sp>
+      <p:pic>
+        <p:nvPicPr>
+          <p:cNvPr id="5" name="Рисунок 4">
+            <a:extLst>
+              <a:ext uri="{FF2B5EF4-FFF2-40B4-BE49-F238E27FC236}">
+                <a16:creationId xmlns:a16="http://schemas.microsoft.com/office/drawing/2014/main" id="{E690A92C-B0A4-BCF3-DCBD-CA3071FB54C7}"/>
+              </a:ext>
+            </a:extLst>
+          </p:cNvPr>
+          <p:cNvPicPr>
+            <a:picLocks noChangeAspect="1"/>
+          </p:cNvPicPr>
+          <p:nvPr/>
+        </p:nvPicPr>
+        <p:blipFill>
+          <a:blip r:embed="rId2">
+            <a:extLst>
+              <a:ext uri="{28A0092B-C50C-407E-A947-70E740481C1C}">
+                <a14:useLocalDpi xmlns:a14="http://schemas.microsoft.com/office/drawing/2010/main" val="0"/>
+              </a:ext>
+              <a:ext uri="{96DAC541-7B7A-43D3-8B79-37D633B846F1}">
+                <asvg:svgBlip xmlns:asvg="http://schemas.microsoft.com/office/drawing/2016/SVG/main" r:embed="rId3"/>
+              </a:ext>
+            </a:extLst>
+          </a:blip>
+          <a:stretch>
+            <a:fillRect/>
+          </a:stretch>
+        </p:blipFill>
+        <p:spPr>
+          <a:xfrm>
+            <a:off x="10028237" y="317498"/>
+            <a:ext cx="1325563" cy="1325563"/>
+          </a:xfrm>
+          <a:prstGeom prst="rect">
+            <a:avLst/>
+          </a:prstGeom>
+        </p:spPr>
+      </p:pic>
     </p:spTree>
     <p:extLst>
       <p:ext uri="{BB962C8B-B14F-4D97-AF65-F5344CB8AC3E}">
         <p14:creationId xmlns:p14="http://schemas.microsoft.com/office/powerpoint/2010/main" val="3278251799"/>
+      </p:ext>
+    </p:extLst>
+  </p:cSld>
+  <p:clrMapOvr>
+    <a:masterClrMapping/>
+  </p:clrMapOvr>
+</p:sld>
+</file>
+
+<file path=ppt/slides/slide16.xml><?xml version="1.0" encoding="utf-8"?>
+<p:sld xmlns:a="http://schemas.openxmlformats.org/drawingml/2006/main" xmlns:r="http://schemas.openxmlformats.org/officeDocument/2006/relationships" xmlns:p="http://schemas.openxmlformats.org/presentationml/2006/main">
+  <p:cSld>
+    <p:spTree>
+      <p:nvGrpSpPr>
+        <p:cNvPr id="1" name=""/>
+        <p:cNvGrpSpPr/>
+        <p:nvPr/>
+      </p:nvGrpSpPr>
+      <p:grpSpPr>
+        <a:xfrm>
+          <a:off x="0" y="0"/>
+          <a:ext cx="0" cy="0"/>
+          <a:chOff x="0" y="0"/>
+          <a:chExt cx="0" cy="0"/>
+        </a:xfrm>
+      </p:grpSpPr>
+      <p:sp>
+        <p:nvSpPr>
+          <p:cNvPr id="2" name="Заголовок 1">
+            <a:extLst>
+              <a:ext uri="{FF2B5EF4-FFF2-40B4-BE49-F238E27FC236}">
+                <a16:creationId xmlns:a16="http://schemas.microsoft.com/office/drawing/2014/main" id="{626CA516-56DA-C840-3666-FC6566FE3DE8}"/>
+              </a:ext>
+            </a:extLst>
+          </p:cNvPr>
+          <p:cNvSpPr>
+            <a:spLocks noGrp="1"/>
+          </p:cNvSpPr>
+          <p:nvPr>
+            <p:ph type="title"/>
+          </p:nvPr>
+        </p:nvSpPr>
+        <p:spPr>
+          <a:xfrm>
+            <a:off x="838200" y="2766218"/>
+            <a:ext cx="10515600" cy="1325563"/>
+          </a:xfrm>
+        </p:spPr>
+        <p:txBody>
+          <a:bodyPr/>
+          <a:lstStyle/>
+          <a:p>
+            <a:pPr algn="ctr"/>
+            <a:r>
+              <a:rPr lang="ru-RU" dirty="0"/>
+              <a:t>Спасибо за внимание</a:t>
+            </a:r>
+          </a:p>
+        </p:txBody>
+      </p:sp>
+    </p:spTree>
+    <p:extLst>
+      <p:ext uri="{BB962C8B-B14F-4D97-AF65-F5344CB8AC3E}">
+        <p14:creationId xmlns:p14="http://schemas.microsoft.com/office/powerpoint/2010/main" val="2813500484"/>
       </p:ext>
     </p:extLst>
   </p:cSld>
@@ -4175,13 +5452,19 @@
         <p:spPr/>
         <p:txBody>
           <a:bodyPr>
-            <a:normAutofit lnSpcReduction="10000"/>
+            <a:normAutofit fontScale="92500" lnSpcReduction="10000"/>
           </a:bodyPr>
           <a:lstStyle/>
           <a:p>
             <a:r>
               <a:rPr lang="ru-RU" dirty="0"/>
-              <a:t>Использование облачной платформы для развертывания программного модуля позволит избежать остановки или поломки системы при ее перегрузке, сберечь средства на избыточную мощность при недогрузке, а также позволит заблаговременно позаботиться о дальнейшей поддержке программного продукта, его гибкости и значительной экономии средств на длительном промежутке времени.</a:t>
+              <a:t>Использование облачной платформы для развертывания программной системы позволит избежать снижения эффективности или отказа системы при ее перегрузке, сберечь средства на избыточную мощность при недогрузке.</a:t>
+            </a:r>
+          </a:p>
+          <a:p>
+            <a:r>
+              <a:rPr lang="ru-RU" dirty="0"/>
+              <a:t>Уход от локальных решений позволит заблаговременно позаботиться о дальнейшей поддержке программного продукта, его гибкости и значительной экономии средств на длительном промежутке времени.</a:t>
             </a:r>
           </a:p>
           <a:p>
@@ -4231,8 +5514,8 @@
         </p:blipFill>
         <p:spPr>
           <a:xfrm>
-            <a:off x="10020300" y="365125"/>
-            <a:ext cx="1333500" cy="1333500"/>
+            <a:off x="10404475" y="365125"/>
+            <a:ext cx="1171575" cy="1171575"/>
           </a:xfrm>
           <a:prstGeom prst="rect">
             <a:avLst/>
@@ -4274,7 +5557,7 @@
           <p:cNvPr id="2" name="Заголовок 1">
             <a:extLst>
               <a:ext uri="{FF2B5EF4-FFF2-40B4-BE49-F238E27FC236}">
-                <a16:creationId xmlns:a16="http://schemas.microsoft.com/office/drawing/2014/main" id="{B5E9050E-51EF-4C5A-AEFA-7D4B8AC59745}"/>
+                <a16:creationId xmlns:a16="http://schemas.microsoft.com/office/drawing/2014/main" id="{10C39105-4734-C79F-98D3-443B625B187F}"/>
               </a:ext>
             </a:extLst>
           </p:cNvPr>
@@ -4292,48 +5575,73 @@
           <a:p>
             <a:r>
               <a:rPr lang="ru-RU" dirty="0"/>
-              <a:t>Цель</a:t>
-            </a:r>
-          </a:p>
-        </p:txBody>
-      </p:sp>
-      <p:sp>
-        <p:nvSpPr>
-          <p:cNvPr id="3" name="Объект 2">
-            <a:extLst>
-              <a:ext uri="{FF2B5EF4-FFF2-40B4-BE49-F238E27FC236}">
-                <a16:creationId xmlns:a16="http://schemas.microsoft.com/office/drawing/2014/main" id="{1EA9F16A-5038-4775-A1C8-24AF525B1095}"/>
-              </a:ext>
-            </a:extLst>
-          </p:cNvPr>
-          <p:cNvSpPr>
-            <a:spLocks noGrp="1"/>
-          </p:cNvSpPr>
-          <p:nvPr>
-            <p:ph idx="1"/>
-          </p:nvPr>
-        </p:nvSpPr>
-        <p:spPr/>
-        <p:txBody>
-          <a:bodyPr/>
-          <a:lstStyle/>
-          <a:p>
-            <a:pPr marL="0" indent="0">
-              <a:buNone/>
-            </a:pPr>
-            <a:r>
+              <a:t>Устройство системы контроля </a:t>
+            </a:r>
+            <a:br>
               <a:rPr lang="ru-RU" dirty="0"/>
-              <a:t>Развёртывание в облачном сервисе  распределенной вычислительной системы, обеспечение отказоустойчивости при изменении интенсивности и объёма информационного потока, оптимизируя вычислительную мощность  используемых аппаратных ресурсов.</a:t>
+            </a:br>
+            <a:r>
+              <a:rPr lang="ru-RU" dirty="0"/>
+              <a:t>расхода топлива</a:t>
             </a:r>
           </a:p>
         </p:txBody>
       </p:sp>
       <p:pic>
         <p:nvPicPr>
-          <p:cNvPr id="5" name="Рисунок 4">
-            <a:extLst>
-              <a:ext uri="{FF2B5EF4-FFF2-40B4-BE49-F238E27FC236}">
-                <a16:creationId xmlns:a16="http://schemas.microsoft.com/office/drawing/2014/main" id="{59873488-C73A-E685-D9E3-D16A4F3CFFD0}"/>
+          <p:cNvPr id="4" name="Picture 8">
+            <a:extLst>
+              <a:ext uri="{FF2B5EF4-FFF2-40B4-BE49-F238E27FC236}">
+                <a16:creationId xmlns:a16="http://schemas.microsoft.com/office/drawing/2014/main" id="{529FA725-B0D6-8EAE-9EAF-EF506C1EDC52}"/>
+              </a:ext>
+            </a:extLst>
+          </p:cNvPr>
+          <p:cNvPicPr>
+            <a:picLocks noGrp="1" noChangeAspect="1" noChangeArrowheads="1"/>
+          </p:cNvPicPr>
+          <p:nvPr>
+            <p:ph idx="1"/>
+          </p:nvPr>
+        </p:nvPicPr>
+        <p:blipFill>
+          <a:blip r:embed="rId2" cstate="print">
+            <a:extLst>
+              <a:ext uri="{28A0092B-C50C-407E-A947-70E740481C1C}">
+                <a14:useLocalDpi xmlns:a14="http://schemas.microsoft.com/office/drawing/2010/main" val="0"/>
+              </a:ext>
+            </a:extLst>
+          </a:blip>
+          <a:srcRect/>
+          <a:stretch>
+            <a:fillRect/>
+          </a:stretch>
+        </p:blipFill>
+        <p:spPr bwMode="auto">
+          <a:xfrm>
+            <a:off x="1710730" y="1965325"/>
+            <a:ext cx="6827440" cy="4351338"/>
+          </a:xfrm>
+          <a:prstGeom prst="rect">
+            <a:avLst/>
+          </a:prstGeom>
+          <a:noFill/>
+          <a:extLst>
+            <a:ext uri="{909E8E84-426E-40DD-AFC4-6F175D3DCCD1}">
+              <a14:hiddenFill xmlns:a14="http://schemas.microsoft.com/office/drawing/2010/main">
+                <a:solidFill>
+                  <a:srgbClr val="FFFFFF"/>
+                </a:solidFill>
+              </a14:hiddenFill>
+            </a:ext>
+          </a:extLst>
+        </p:spPr>
+      </p:pic>
+      <p:pic>
+        <p:nvPicPr>
+          <p:cNvPr id="6" name="Рисунок 5">
+            <a:extLst>
+              <a:ext uri="{FF2B5EF4-FFF2-40B4-BE49-F238E27FC236}">
+                <a16:creationId xmlns:a16="http://schemas.microsoft.com/office/drawing/2014/main" id="{97079364-CBF8-C6E8-ED96-118A459C5BDA}"/>
               </a:ext>
             </a:extLst>
           </p:cNvPr>
@@ -4343,13 +5651,13 @@
           <p:nvPr/>
         </p:nvPicPr>
         <p:blipFill>
-          <a:blip r:embed="rId2">
+          <a:blip r:embed="rId3">
             <a:extLst>
               <a:ext uri="{28A0092B-C50C-407E-A947-70E740481C1C}">
                 <a14:useLocalDpi xmlns:a14="http://schemas.microsoft.com/office/drawing/2010/main" val="0"/>
               </a:ext>
               <a:ext uri="{96DAC541-7B7A-43D3-8B79-37D633B846F1}">
-                <asvg:svgBlip xmlns:asvg="http://schemas.microsoft.com/office/drawing/2016/SVG/main" r:embed="rId3"/>
+                <asvg:svgBlip xmlns:asvg="http://schemas.microsoft.com/office/drawing/2016/SVG/main" r:embed="rId4"/>
               </a:ext>
             </a:extLst>
           </a:blip>
@@ -4358,9 +5666,9 @@
           </a:stretch>
         </p:blipFill>
         <p:spPr>
-          <a:xfrm>
-            <a:off x="9829800" y="234157"/>
-            <a:ext cx="1524000" cy="1524000"/>
+          <a:xfrm rot="10800000" flipH="1" flipV="1">
+            <a:off x="10299700" y="365125"/>
+            <a:ext cx="1295400" cy="1295400"/>
           </a:xfrm>
           <a:prstGeom prst="rect">
             <a:avLst/>
@@ -4370,7 +5678,7 @@
     </p:spTree>
     <p:extLst>
       <p:ext uri="{BB962C8B-B14F-4D97-AF65-F5344CB8AC3E}">
-        <p14:creationId xmlns:p14="http://schemas.microsoft.com/office/powerpoint/2010/main" val="828748949"/>
+        <p14:creationId xmlns:p14="http://schemas.microsoft.com/office/powerpoint/2010/main" val="897164946"/>
       </p:ext>
     </p:extLst>
   </p:cSld>
@@ -4402,7 +5710,7 @@
           <p:cNvPr id="2" name="Заголовок 1">
             <a:extLst>
               <a:ext uri="{FF2B5EF4-FFF2-40B4-BE49-F238E27FC236}">
-                <a16:creationId xmlns:a16="http://schemas.microsoft.com/office/drawing/2014/main" id="{2AA86CF9-39EF-4F51-8F24-3A88A779F754}"/>
+                <a16:creationId xmlns:a16="http://schemas.microsoft.com/office/drawing/2014/main" id="{B5E9050E-51EF-4C5A-AEFA-7D4B8AC59745}"/>
               </a:ext>
             </a:extLst>
           </p:cNvPr>
@@ -4413,63 +5721,92 @@
             <p:ph type="title"/>
           </p:nvPr>
         </p:nvSpPr>
-        <p:spPr>
-          <a:xfrm>
-            <a:off x="838200" y="1"/>
-            <a:ext cx="10515600" cy="1690688"/>
-          </a:xfrm>
-        </p:spPr>
-        <p:txBody>
-          <a:bodyPr>
-            <a:normAutofit/>
-          </a:bodyPr>
-          <a:lstStyle/>
-          <a:p>
-            <a:r>
-              <a:rPr lang="ru-RU" sz="3600" b="1" dirty="0"/>
-              <a:t>Иллюстрация предметной области функционирования автоматизированной системы</a:t>
+        <p:spPr/>
+        <p:txBody>
+          <a:bodyPr/>
+          <a:lstStyle/>
+          <a:p>
+            <a:r>
+              <a:rPr lang="ru-RU" dirty="0"/>
+              <a:t>Цель</a:t>
+            </a:r>
+          </a:p>
+        </p:txBody>
+      </p:sp>
+      <p:sp>
+        <p:nvSpPr>
+          <p:cNvPr id="3" name="Объект 2">
+            <a:extLst>
+              <a:ext uri="{FF2B5EF4-FFF2-40B4-BE49-F238E27FC236}">
+                <a16:creationId xmlns:a16="http://schemas.microsoft.com/office/drawing/2014/main" id="{1EA9F16A-5038-4775-A1C8-24AF525B1095}"/>
+              </a:ext>
+            </a:extLst>
+          </p:cNvPr>
+          <p:cNvSpPr>
+            <a:spLocks noGrp="1"/>
+          </p:cNvSpPr>
+          <p:nvPr>
+            <p:ph idx="1"/>
+          </p:nvPr>
+        </p:nvSpPr>
+        <p:spPr/>
+        <p:txBody>
+          <a:bodyPr/>
+          <a:lstStyle/>
+          <a:p>
+            <a:pPr marL="0" indent="0">
+              <a:buNone/>
+            </a:pPr>
+            <a:r>
+              <a:rPr lang="ru-RU" dirty="0"/>
+              <a:t>Развёртывание в облачном сервисе  распределенной вычислительной системы, и обеспечение ее отказоустойчивости при изменении интенсивности и объёма информационного потока, применяя оптимизацию используемых аппаратных ресурсов.</a:t>
             </a:r>
           </a:p>
         </p:txBody>
       </p:sp>
       <p:pic>
         <p:nvPicPr>
-          <p:cNvPr id="4" name="image18.png">
-            <a:extLst>
-              <a:ext uri="{FF2B5EF4-FFF2-40B4-BE49-F238E27FC236}">
-                <a16:creationId xmlns:a16="http://schemas.microsoft.com/office/drawing/2014/main" id="{FA66BE28-3344-42FD-9C7F-23FA079E109B}"/>
+          <p:cNvPr id="5" name="Рисунок 4">
+            <a:extLst>
+              <a:ext uri="{FF2B5EF4-FFF2-40B4-BE49-F238E27FC236}">
+                <a16:creationId xmlns:a16="http://schemas.microsoft.com/office/drawing/2014/main" id="{59873488-C73A-E685-D9E3-D16A4F3CFFD0}"/>
               </a:ext>
             </a:extLst>
           </p:cNvPr>
           <p:cNvPicPr>
-            <a:picLocks noGrp="1"/>
+            <a:picLocks noChangeAspect="1"/>
           </p:cNvPicPr>
-          <p:nvPr>
-            <p:ph idx="1"/>
-          </p:nvPr>
+          <p:nvPr/>
         </p:nvPicPr>
         <p:blipFill>
-          <a:blip r:embed="rId2"/>
-          <a:srcRect/>
+          <a:blip r:embed="rId2">
+            <a:extLst>
+              <a:ext uri="{28A0092B-C50C-407E-A947-70E740481C1C}">
+                <a14:useLocalDpi xmlns:a14="http://schemas.microsoft.com/office/drawing/2010/main" val="0"/>
+              </a:ext>
+              <a:ext uri="{96DAC541-7B7A-43D3-8B79-37D633B846F1}">
+                <asvg:svgBlip xmlns:asvg="http://schemas.microsoft.com/office/drawing/2016/SVG/main" r:embed="rId3"/>
+              </a:ext>
+            </a:extLst>
+          </a:blip>
           <a:stretch>
             <a:fillRect/>
           </a:stretch>
         </p:blipFill>
         <p:spPr>
           <a:xfrm>
-            <a:off x="838200" y="1459832"/>
-            <a:ext cx="10515600" cy="5149515"/>
+            <a:off x="10310018" y="365125"/>
+            <a:ext cx="1325563" cy="1325563"/>
           </a:xfrm>
           <a:prstGeom prst="rect">
             <a:avLst/>
           </a:prstGeom>
-          <a:ln/>
         </p:spPr>
       </p:pic>
     </p:spTree>
     <p:extLst>
       <p:ext uri="{BB962C8B-B14F-4D97-AF65-F5344CB8AC3E}">
-        <p14:creationId xmlns:p14="http://schemas.microsoft.com/office/powerpoint/2010/main" val="2454373353"/>
+        <p14:creationId xmlns:p14="http://schemas.microsoft.com/office/powerpoint/2010/main" val="828748949"/>
       </p:ext>
     </p:extLst>
   </p:cSld>
@@ -4501,7 +5838,7 @@
           <p:cNvPr id="2" name="Заголовок 1">
             <a:extLst>
               <a:ext uri="{FF2B5EF4-FFF2-40B4-BE49-F238E27FC236}">
-                <a16:creationId xmlns:a16="http://schemas.microsoft.com/office/drawing/2014/main" id="{3EC753A1-B2A4-4AF7-9C49-D5706B34B832}"/>
+                <a16:creationId xmlns:a16="http://schemas.microsoft.com/office/drawing/2014/main" id="{4DEC5489-4FAE-1C7C-CE92-E6C253C073BF}"/>
               </a:ext>
             </a:extLst>
           </p:cNvPr>
@@ -4512,91 +5849,109 @@
             <p:ph type="title"/>
           </p:nvPr>
         </p:nvSpPr>
-        <p:spPr/>
+        <p:spPr>
+          <a:xfrm>
+            <a:off x="838199" y="0"/>
+            <a:ext cx="10515600" cy="1325563"/>
+          </a:xfrm>
+        </p:spPr>
         <p:txBody>
           <a:bodyPr/>
           <a:lstStyle/>
           <a:p>
             <a:r>
               <a:rPr lang="ru-RU" dirty="0"/>
-              <a:t>Задачи</a:t>
-            </a:r>
-            <a:endParaRPr lang="ru-RU" u="sng" dirty="0"/>
-          </a:p>
-        </p:txBody>
-      </p:sp>
-      <p:sp>
-        <p:nvSpPr>
-          <p:cNvPr id="3" name="Объект 2">
-            <a:extLst>
-              <a:ext uri="{FF2B5EF4-FFF2-40B4-BE49-F238E27FC236}">
-                <a16:creationId xmlns:a16="http://schemas.microsoft.com/office/drawing/2014/main" id="{855C7ECA-5427-400E-B749-46430B40DB5E}"/>
-              </a:ext>
-            </a:extLst>
-          </p:cNvPr>
-          <p:cNvSpPr>
-            <a:spLocks noGrp="1"/>
-          </p:cNvSpPr>
+              <a:t>Схема работы решения</a:t>
+            </a:r>
+          </a:p>
+        </p:txBody>
+      </p:sp>
+      <p:pic>
+        <p:nvPicPr>
+          <p:cNvPr id="4" name="Объект 3">
+            <a:extLst>
+              <a:ext uri="{FF2B5EF4-FFF2-40B4-BE49-F238E27FC236}">
+                <a16:creationId xmlns:a16="http://schemas.microsoft.com/office/drawing/2014/main" id="{9C607063-410B-578F-5830-44DFEE45AA26}"/>
+              </a:ext>
+            </a:extLst>
+          </p:cNvPr>
+          <p:cNvPicPr>
+            <a:picLocks noGrp="1" noChangeAspect="1"/>
+          </p:cNvPicPr>
           <p:nvPr>
             <p:ph idx="1"/>
           </p:nvPr>
-        </p:nvSpPr>
-        <p:spPr/>
-        <p:txBody>
-          <a:bodyPr>
-            <a:normAutofit fontScale="92500" lnSpcReduction="20000"/>
-          </a:bodyPr>
-          <a:lstStyle/>
-          <a:p>
-            <a:pPr marL="514350" indent="-514350">
-              <a:buFont typeface="+mj-lt"/>
-              <a:buAutoNum type="arabicPeriod"/>
-            </a:pPr>
-            <a:r>
-              <a:rPr lang="ru-RU" dirty="0"/>
-              <a:t>Сравнительный анализ эффективности работы существующих автоматизированных систем мониторинга расхода топлива при существенном изменении объёма и характера нагрузки</a:t>
-            </a:r>
-            <a:r>
-              <a:rPr lang="en-US" dirty="0"/>
-              <a:t>;</a:t>
-            </a:r>
-          </a:p>
-          <a:p>
-            <a:pPr marL="514350" indent="-514350">
-              <a:buFont typeface="+mj-lt"/>
-              <a:buAutoNum type="arabicPeriod"/>
-            </a:pPr>
-            <a:r>
-              <a:rPr lang="ru-RU" dirty="0"/>
-              <a:t>Установление зависимости стабильности функционирования серверного узла распределенной вычислительной системы и его состояния от входных параметров и определение оптимальной вычислительной мощности при заданной нагрузке; </a:t>
-            </a:r>
-          </a:p>
-          <a:p>
-            <a:pPr marL="514350" indent="-514350">
-              <a:buFont typeface="+mj-lt"/>
-              <a:buAutoNum type="arabicPeriod"/>
-            </a:pPr>
-            <a:r>
-              <a:rPr lang="ru-RU" dirty="0"/>
-              <a:t>Обеспечение оптимального распределения нагрузки  на сервера распределенной вычислительной системы (РИВС) при условии изменения характера и интенсивности входящего потока заявок с помощью разработанного программного модуля;</a:t>
-            </a:r>
-          </a:p>
-          <a:p>
-            <a:pPr marL="514350" indent="-514350">
-              <a:buFont typeface="+mj-lt"/>
-              <a:buAutoNum type="arabicPeriod"/>
-            </a:pPr>
-            <a:r>
-              <a:rPr lang="ru-RU" dirty="0"/>
-              <a:t>Проведение нагрузочного тестирования разработанной системы и оценка полученных показателей эффективности.</a:t>
-            </a:r>
-          </a:p>
-        </p:txBody>
-      </p:sp>
+        </p:nvPicPr>
+        <p:blipFill>
+          <a:blip r:embed="rId2">
+            <a:extLst>
+              <a:ext uri="{28A0092B-C50C-407E-A947-70E740481C1C}">
+                <a14:useLocalDpi xmlns:a14="http://schemas.microsoft.com/office/drawing/2010/main" val="0"/>
+              </a:ext>
+            </a:extLst>
+          </a:blip>
+          <a:srcRect/>
+          <a:stretch>
+            <a:fillRect/>
+          </a:stretch>
+        </p:blipFill>
+        <p:spPr bwMode="auto">
+          <a:xfrm>
+            <a:off x="2756356" y="1325562"/>
+            <a:ext cx="5661462" cy="5056187"/>
+          </a:xfrm>
+          <a:prstGeom prst="rect">
+            <a:avLst/>
+          </a:prstGeom>
+          <a:noFill/>
+          <a:ln>
+            <a:noFill/>
+          </a:ln>
+        </p:spPr>
+      </p:pic>
+      <p:pic>
+        <p:nvPicPr>
+          <p:cNvPr id="6" name="Рисунок 5">
+            <a:extLst>
+              <a:ext uri="{FF2B5EF4-FFF2-40B4-BE49-F238E27FC236}">
+                <a16:creationId xmlns:a16="http://schemas.microsoft.com/office/drawing/2014/main" id="{1BA52093-121D-10A6-6FA2-B6F8014BD8E7}"/>
+              </a:ext>
+            </a:extLst>
+          </p:cNvPr>
+          <p:cNvPicPr>
+            <a:picLocks noChangeAspect="1"/>
+          </p:cNvPicPr>
+          <p:nvPr/>
+        </p:nvPicPr>
+        <p:blipFill>
+          <a:blip r:embed="rId3">
+            <a:extLst>
+              <a:ext uri="{28A0092B-C50C-407E-A947-70E740481C1C}">
+                <a14:useLocalDpi xmlns:a14="http://schemas.microsoft.com/office/drawing/2010/main" val="0"/>
+              </a:ext>
+              <a:ext uri="{96DAC541-7B7A-43D3-8B79-37D633B846F1}">
+                <asvg:svgBlip xmlns:asvg="http://schemas.microsoft.com/office/drawing/2016/SVG/main" r:embed="rId4"/>
+              </a:ext>
+            </a:extLst>
+          </a:blip>
+          <a:stretch>
+            <a:fillRect/>
+          </a:stretch>
+        </p:blipFill>
+        <p:spPr>
+          <a:xfrm>
+            <a:off x="10124379" y="359669"/>
+            <a:ext cx="1229420" cy="1229420"/>
+          </a:xfrm>
+          <a:prstGeom prst="rect">
+            <a:avLst/>
+          </a:prstGeom>
+        </p:spPr>
+      </p:pic>
     </p:spTree>
     <p:extLst>
       <p:ext uri="{BB962C8B-B14F-4D97-AF65-F5344CB8AC3E}">
-        <p14:creationId xmlns:p14="http://schemas.microsoft.com/office/powerpoint/2010/main" val="193326433"/>
+        <p14:creationId xmlns:p14="http://schemas.microsoft.com/office/powerpoint/2010/main" val="3836774892"/>
       </p:ext>
     </p:extLst>
   </p:cSld>
@@ -4628,7 +5983,7 @@
           <p:cNvPr id="2" name="Заголовок 1">
             <a:extLst>
               <a:ext uri="{FF2B5EF4-FFF2-40B4-BE49-F238E27FC236}">
-                <a16:creationId xmlns:a16="http://schemas.microsoft.com/office/drawing/2014/main" id="{DDB402ED-61D8-4BA7-9EED-763FD239A9D1}"/>
+                <a16:creationId xmlns:a16="http://schemas.microsoft.com/office/drawing/2014/main" id="{3EC753A1-B2A4-4AF7-9C49-D5706B34B832}"/>
               </a:ext>
             </a:extLst>
           </p:cNvPr>
@@ -4646,8 +6001,9 @@
           <a:p>
             <a:r>
               <a:rPr lang="ru-RU" dirty="0"/>
-              <a:t>Этапы разработки</a:t>
-            </a:r>
+              <a:t>Задачи</a:t>
+            </a:r>
+            <a:endParaRPr lang="ru-RU" u="sng" dirty="0"/>
           </a:p>
         </p:txBody>
       </p:sp>
@@ -4656,7 +6012,7 @@
           <p:cNvPr id="3" name="Объект 2">
             <a:extLst>
               <a:ext uri="{FF2B5EF4-FFF2-40B4-BE49-F238E27FC236}">
-                <a16:creationId xmlns:a16="http://schemas.microsoft.com/office/drawing/2014/main" id="{9D997166-A9D4-4E90-8133-9C587302F3E0}"/>
+                <a16:creationId xmlns:a16="http://schemas.microsoft.com/office/drawing/2014/main" id="{855C7ECA-5427-400E-B749-46430B40DB5E}"/>
               </a:ext>
             </a:extLst>
           </p:cNvPr>
@@ -4667,14 +6023,25 @@
             <p:ph idx="1"/>
           </p:nvPr>
         </p:nvSpPr>
-        <p:spPr/>
-        <p:txBody>
-          <a:bodyPr/>
-          <a:lstStyle/>
-          <a:p>
+        <p:spPr>
+          <a:xfrm>
+            <a:off x="654050" y="2022475"/>
+            <a:ext cx="10515600" cy="4351338"/>
+          </a:xfrm>
+        </p:spPr>
+        <p:txBody>
+          <a:bodyPr>
+            <a:normAutofit fontScale="92500" lnSpcReduction="20000"/>
+          </a:bodyPr>
+          <a:lstStyle/>
+          <a:p>
+            <a:pPr marL="514350" indent="-514350">
+              <a:buFont typeface="+mj-lt"/>
+              <a:buAutoNum type="arabicPeriod"/>
+            </a:pPr>
             <a:r>
               <a:rPr lang="ru-RU" dirty="0"/>
-              <a:t>Сравнительный анализ решений потенциальных облачных платформ для развертывания системы</a:t>
+              <a:t>Сравнительный анализ эффективности работы существующих автоматизированных систем мониторинга расхода топлива при существенном изменении объёма и характера нагрузки</a:t>
             </a:r>
             <a:r>
               <a:rPr lang="en-US" dirty="0"/>
@@ -4682,47 +6049,80 @@
             </a:r>
           </a:p>
           <a:p>
+            <a:pPr marL="514350" indent="-514350">
+              <a:buFont typeface="+mj-lt"/>
+              <a:buAutoNum type="arabicPeriod"/>
+            </a:pPr>
             <a:r>
               <a:rPr lang="ru-RU" dirty="0"/>
-              <a:t>Проектирование архитектуры разрабатываемой системы</a:t>
-            </a:r>
-            <a:r>
-              <a:rPr lang="en-US" dirty="0"/>
-              <a:t>;</a:t>
-            </a:r>
-          </a:p>
-          <a:p>
+              <a:t>Установление зависимости стабильности функционирования серверного узла распределенной вычислительной системы и его состояния от входных параметров и определение оптимальной вычислительной мощности при заданной нагрузке; </a:t>
+            </a:r>
+          </a:p>
+          <a:p>
+            <a:pPr marL="514350" indent="-514350">
+              <a:buFont typeface="+mj-lt"/>
+              <a:buAutoNum type="arabicPeriod"/>
+            </a:pPr>
             <a:r>
               <a:rPr lang="ru-RU" dirty="0"/>
-              <a:t>Реализация программного модуля</a:t>
-            </a:r>
-            <a:r>
-              <a:rPr lang="en-US" dirty="0"/>
-              <a:t>;</a:t>
-            </a:r>
-          </a:p>
-          <a:p>
+              <a:t>Обеспечение оптимального распределения нагрузки  на сервера распределенной вычислительной системы (РИВС) при условии изменения характера и интенсивности входящего потока заявок с помощью разработанного программного модуля;</a:t>
+            </a:r>
+          </a:p>
+          <a:p>
+            <a:pPr marL="514350" indent="-514350">
+              <a:buFont typeface="+mj-lt"/>
+              <a:buAutoNum type="arabicPeriod"/>
+            </a:pPr>
             <a:r>
               <a:rPr lang="ru-RU" dirty="0"/>
-              <a:t>Размещение решения в облаке</a:t>
-            </a:r>
-            <a:r>
-              <a:rPr lang="en-US" dirty="0"/>
-              <a:t>;</a:t>
-            </a:r>
-          </a:p>
-          <a:p>
-            <a:r>
-              <a:rPr lang="ru-RU" dirty="0"/>
-              <a:t>Проведение стресс-тестов и демонстрация возможностей масштабирования приложения.</a:t>
-            </a:r>
-          </a:p>
-        </p:txBody>
-      </p:sp>
+              <a:t>Проведение нагрузочного тестирования разработанной системы и оценка полученных показателей эффективности.</a:t>
+            </a:r>
+          </a:p>
+        </p:txBody>
+      </p:sp>
+      <p:pic>
+        <p:nvPicPr>
+          <p:cNvPr id="5" name="Рисунок 4">
+            <a:extLst>
+              <a:ext uri="{FF2B5EF4-FFF2-40B4-BE49-F238E27FC236}">
+                <a16:creationId xmlns:a16="http://schemas.microsoft.com/office/drawing/2014/main" id="{BE46070A-8DE5-859F-76C2-34A1E85EF551}"/>
+              </a:ext>
+            </a:extLst>
+          </p:cNvPr>
+          <p:cNvPicPr>
+            <a:picLocks noChangeAspect="1"/>
+          </p:cNvPicPr>
+          <p:nvPr/>
+        </p:nvPicPr>
+        <p:blipFill>
+          <a:blip r:embed="rId2">
+            <a:extLst>
+              <a:ext uri="{28A0092B-C50C-407E-A947-70E740481C1C}">
+                <a14:useLocalDpi xmlns:a14="http://schemas.microsoft.com/office/drawing/2010/main" val="0"/>
+              </a:ext>
+              <a:ext uri="{96DAC541-7B7A-43D3-8B79-37D633B846F1}">
+                <asvg:svgBlip xmlns:asvg="http://schemas.microsoft.com/office/drawing/2016/SVG/main" r:embed="rId3"/>
+              </a:ext>
+            </a:extLst>
+          </a:blip>
+          <a:stretch>
+            <a:fillRect/>
+          </a:stretch>
+        </p:blipFill>
+        <p:spPr>
+          <a:xfrm>
+            <a:off x="10157618" y="365125"/>
+            <a:ext cx="1546225" cy="1546225"/>
+          </a:xfrm>
+          <a:prstGeom prst="rect">
+            <a:avLst/>
+          </a:prstGeom>
+        </p:spPr>
+      </p:pic>
     </p:spTree>
     <p:extLst>
       <p:ext uri="{BB962C8B-B14F-4D97-AF65-F5344CB8AC3E}">
-        <p14:creationId xmlns:p14="http://schemas.microsoft.com/office/powerpoint/2010/main" val="4105507015"/>
+        <p14:creationId xmlns:p14="http://schemas.microsoft.com/office/powerpoint/2010/main" val="193326433"/>
       </p:ext>
     </p:extLst>
   </p:cSld>
@@ -4754,7 +6154,7 @@
           <p:cNvPr id="2" name="Заголовок 1">
             <a:extLst>
               <a:ext uri="{FF2B5EF4-FFF2-40B4-BE49-F238E27FC236}">
-                <a16:creationId xmlns:a16="http://schemas.microsoft.com/office/drawing/2014/main" id="{BE1713C2-2CC5-4530-9F81-E74C1EFE8ECE}"/>
+                <a16:creationId xmlns:a16="http://schemas.microsoft.com/office/drawing/2014/main" id="{DDB402ED-61D8-4BA7-9EED-763FD239A9D1}"/>
               </a:ext>
             </a:extLst>
           </p:cNvPr>
@@ -4772,7 +6172,7 @@
           <a:p>
             <a:r>
               <a:rPr lang="ru-RU" dirty="0"/>
-              <a:t>Образ результата</a:t>
+              <a:t>Этапы разработки</a:t>
             </a:r>
           </a:p>
         </p:txBody>
@@ -4782,7 +6182,7 @@
           <p:cNvPr id="3" name="Объект 2">
             <a:extLst>
               <a:ext uri="{FF2B5EF4-FFF2-40B4-BE49-F238E27FC236}">
-                <a16:creationId xmlns:a16="http://schemas.microsoft.com/office/drawing/2014/main" id="{54A60F72-9D9E-431B-AB80-4668CBF9C4EE}"/>
+                <a16:creationId xmlns:a16="http://schemas.microsoft.com/office/drawing/2014/main" id="{9D997166-A9D4-4E90-8133-9C587302F3E0}"/>
               </a:ext>
             </a:extLst>
           </p:cNvPr>
@@ -4795,46 +6195,104 @@
         </p:nvSpPr>
         <p:spPr>
           <a:xfrm>
-            <a:off x="838200" y="1491916"/>
-            <a:ext cx="10515600" cy="4685047"/>
+            <a:off x="838200" y="1939925"/>
+            <a:ext cx="10515600" cy="4351338"/>
           </a:xfrm>
         </p:spPr>
         <p:txBody>
-          <a:bodyPr>
-            <a:normAutofit/>
-          </a:bodyPr>
-          <a:lstStyle/>
-          <a:p>
-            <a:pPr marL="0" indent="0">
-              <a:buNone/>
-            </a:pPr>
+          <a:bodyPr/>
+          <a:lstStyle/>
+          <a:p>
             <a:r>
               <a:rPr lang="ru-RU" dirty="0"/>
-              <a:t>На основе анализа задач балансировки нагрузки в распределенных вычислительных системах спроектирована, реализована в виде программного модуля и размещена в облачном сервисе автоматизированная вычислительная система мониторинга и контроля расхода топлива на примере топливо-снабжающей организации.</a:t>
-            </a:r>
-            <a:endParaRPr lang="en-US" dirty="0"/>
-          </a:p>
-          <a:p>
-            <a:pPr marL="0" indent="0">
-              <a:buNone/>
-            </a:pPr>
+              <a:t>Сравнительный анализ решений потенциальных облачных платформ для развертывания системы</a:t>
+            </a:r>
+            <a:r>
+              <a:rPr lang="en-US" dirty="0"/>
+              <a:t>;</a:t>
+            </a:r>
+          </a:p>
+          <a:p>
             <a:r>
               <a:rPr lang="ru-RU" dirty="0"/>
-              <a:t>В результате работы программного модуля продемонстрированы опции облачной платформы по горизонтальному масштабированию приложения. Показано, что результаты балансировки существенно зависят от колебаний интенсивности входного потока запросов.</a:t>
-            </a:r>
-          </a:p>
-          <a:p>
-            <a:pPr marL="0" indent="0">
-              <a:buNone/>
-            </a:pPr>
-            <a:endParaRPr lang="ru-RU" dirty="0"/>
-          </a:p>
-        </p:txBody>
-      </p:sp>
+              <a:t>Проектирование архитектуры разрабатываемой системы</a:t>
+            </a:r>
+            <a:r>
+              <a:rPr lang="en-US" dirty="0"/>
+              <a:t>;</a:t>
+            </a:r>
+          </a:p>
+          <a:p>
+            <a:r>
+              <a:rPr lang="ru-RU" dirty="0"/>
+              <a:t>Реализация программной системы</a:t>
+            </a:r>
+            <a:r>
+              <a:rPr lang="en-US" dirty="0"/>
+              <a:t>;</a:t>
+            </a:r>
+          </a:p>
+          <a:p>
+            <a:r>
+              <a:rPr lang="ru-RU" dirty="0"/>
+              <a:t>Размещение решения в облаке</a:t>
+            </a:r>
+            <a:r>
+              <a:rPr lang="en-US" dirty="0"/>
+              <a:t>;</a:t>
+            </a:r>
+          </a:p>
+          <a:p>
+            <a:r>
+              <a:rPr lang="ru-RU" dirty="0"/>
+              <a:t>Проведение стресс-тестов и демонстрация возможностей масштабирования приложения.</a:t>
+            </a:r>
+          </a:p>
+        </p:txBody>
+      </p:sp>
+      <p:pic>
+        <p:nvPicPr>
+          <p:cNvPr id="7" name="Рисунок 6">
+            <a:extLst>
+              <a:ext uri="{FF2B5EF4-FFF2-40B4-BE49-F238E27FC236}">
+                <a16:creationId xmlns:a16="http://schemas.microsoft.com/office/drawing/2014/main" id="{BFBAA15E-2F6B-4057-FCC7-4A6501AE8104}"/>
+              </a:ext>
+            </a:extLst>
+          </p:cNvPr>
+          <p:cNvPicPr>
+            <a:picLocks noChangeAspect="1"/>
+          </p:cNvPicPr>
+          <p:nvPr/>
+        </p:nvPicPr>
+        <p:blipFill>
+          <a:blip r:embed="rId2">
+            <a:extLst>
+              <a:ext uri="{28A0092B-C50C-407E-A947-70E740481C1C}">
+                <a14:useLocalDpi xmlns:a14="http://schemas.microsoft.com/office/drawing/2010/main" val="0"/>
+              </a:ext>
+              <a:ext uri="{96DAC541-7B7A-43D3-8B79-37D633B846F1}">
+                <asvg:svgBlip xmlns:asvg="http://schemas.microsoft.com/office/drawing/2016/SVG/main" r:embed="rId3"/>
+              </a:ext>
+            </a:extLst>
+          </a:blip>
+          <a:stretch>
+            <a:fillRect/>
+          </a:stretch>
+        </p:blipFill>
+        <p:spPr>
+          <a:xfrm>
+            <a:off x="10071100" y="365125"/>
+            <a:ext cx="1441450" cy="1441450"/>
+          </a:xfrm>
+          <a:prstGeom prst="rect">
+            <a:avLst/>
+          </a:prstGeom>
+        </p:spPr>
+      </p:pic>
     </p:spTree>
     <p:extLst>
       <p:ext uri="{BB962C8B-B14F-4D97-AF65-F5344CB8AC3E}">
-        <p14:creationId xmlns:p14="http://schemas.microsoft.com/office/powerpoint/2010/main" val="2076769733"/>
+        <p14:creationId xmlns:p14="http://schemas.microsoft.com/office/powerpoint/2010/main" val="4105507015"/>
       </p:ext>
     </p:extLst>
   </p:cSld>
@@ -4863,10 +6321,10 @@
       </p:grpSpPr>
       <p:sp>
         <p:nvSpPr>
-          <p:cNvPr id="4" name="Заголовок 3">
-            <a:extLst>
-              <a:ext uri="{FF2B5EF4-FFF2-40B4-BE49-F238E27FC236}">
-                <a16:creationId xmlns:a16="http://schemas.microsoft.com/office/drawing/2014/main" id="{68049E8F-F823-4CC3-8EE6-E4C351AB2F42}"/>
+          <p:cNvPr id="2" name="Заголовок 1">
+            <a:extLst>
+              <a:ext uri="{FF2B5EF4-FFF2-40B4-BE49-F238E27FC236}">
+                <a16:creationId xmlns:a16="http://schemas.microsoft.com/office/drawing/2014/main" id="{4F997740-A762-CEBE-8929-770AAE5E5750}"/>
               </a:ext>
             </a:extLst>
           </p:cNvPr>
@@ -4884,1307 +6342,105 @@
           <a:p>
             <a:r>
               <a:rPr lang="ru-RU" dirty="0"/>
-              <a:t>Графическая иллюстрация</a:t>
-            </a:r>
-          </a:p>
-        </p:txBody>
-      </p:sp>
-      <p:sp>
-        <p:nvSpPr>
-          <p:cNvPr id="5" name="Объект 4">
-            <a:extLst>
-              <a:ext uri="{FF2B5EF4-FFF2-40B4-BE49-F238E27FC236}">
-                <a16:creationId xmlns:a16="http://schemas.microsoft.com/office/drawing/2014/main" id="{41910E3A-DE2A-4494-A61E-B2D946BB26BF}"/>
-              </a:ext>
-            </a:extLst>
-          </p:cNvPr>
-          <p:cNvSpPr>
-            <a:spLocks noGrp="1"/>
-          </p:cNvSpPr>
-          <p:nvPr>
-            <p:ph sz="half" idx="1"/>
-          </p:nvPr>
-        </p:nvSpPr>
+              <a:t>Динамическое масштабирование</a:t>
+            </a:r>
+          </a:p>
+        </p:txBody>
+      </p:sp>
+      <p:sp>
+        <p:nvSpPr>
+          <p:cNvPr id="3" name="Объект 2">
+            <a:extLst>
+              <a:ext uri="{FF2B5EF4-FFF2-40B4-BE49-F238E27FC236}">
+                <a16:creationId xmlns:a16="http://schemas.microsoft.com/office/drawing/2014/main" id="{F91E511A-02A7-7742-2863-E53CD9576CD9}"/>
+              </a:ext>
+            </a:extLst>
+          </p:cNvPr>
+          <p:cNvSpPr>
+            <a:spLocks noGrp="1"/>
+          </p:cNvSpPr>
+          <p:nvPr>
+            <p:ph idx="1"/>
+          </p:nvPr>
+        </p:nvSpPr>
+        <p:spPr/>
+        <p:txBody>
+          <a:bodyPr/>
+          <a:lstStyle/>
+          <a:p>
+            <a:r>
+              <a:rPr lang="ru-RU" dirty="0"/>
+              <a:t>Для исчерпывающего понимания сути решения необходимо понимать, что такое динамическое масштабирование. Под подразумевается свойство системы регулировать ресурсы, не требуя оперативного вмешательства пользователя.</a:t>
+            </a:r>
+          </a:p>
+          <a:p>
+            <a:r>
+              <a:rPr lang="ru-RU" dirty="0"/>
+              <a:t>Выделяют два вида</a:t>
+            </a:r>
+            <a:r>
+              <a:rPr lang="en-US" dirty="0"/>
+              <a:t>: </a:t>
+            </a:r>
+            <a:r>
+              <a:rPr lang="ru-RU" dirty="0"/>
+              <a:t>вертикальное и горизонтальное.</a:t>
+            </a:r>
+          </a:p>
+          <a:p>
+            <a:r>
+              <a:rPr lang="ru-RU" dirty="0"/>
+              <a:t>Мы будем рассматривать только второй, вариант, который из себя представляет наращивание количества рабочих мощностей, а не их качество, как в первом варианте.</a:t>
+            </a:r>
+          </a:p>
+          <a:p>
+            <a:endParaRPr lang="ru-RU" dirty="0"/>
+          </a:p>
+        </p:txBody>
+      </p:sp>
+      <p:pic>
+        <p:nvPicPr>
+          <p:cNvPr id="5" name="Рисунок 4">
+            <a:extLst>
+              <a:ext uri="{FF2B5EF4-FFF2-40B4-BE49-F238E27FC236}">
+                <a16:creationId xmlns:a16="http://schemas.microsoft.com/office/drawing/2014/main" id="{F190BAED-742B-AAC8-F83E-8C89E4D78A9E}"/>
+              </a:ext>
+            </a:extLst>
+          </p:cNvPr>
+          <p:cNvPicPr>
+            <a:picLocks noChangeAspect="1"/>
+          </p:cNvPicPr>
+          <p:nvPr/>
+        </p:nvPicPr>
+        <p:blipFill>
+          <a:blip r:embed="rId2">
+            <a:extLst>
+              <a:ext uri="{28A0092B-C50C-407E-A947-70E740481C1C}">
+                <a14:useLocalDpi xmlns:a14="http://schemas.microsoft.com/office/drawing/2010/main" val="0"/>
+              </a:ext>
+              <a:ext uri="{96DAC541-7B7A-43D3-8B79-37D633B846F1}">
+                <asvg:svgBlip xmlns:asvg="http://schemas.microsoft.com/office/drawing/2016/SVG/main" r:embed="rId3"/>
+              </a:ext>
+            </a:extLst>
+          </a:blip>
+          <a:stretch>
+            <a:fillRect/>
+          </a:stretch>
+        </p:blipFill>
         <p:spPr>
           <a:xfrm>
-            <a:off x="1454138" y="1856759"/>
-            <a:ext cx="5181600" cy="4351338"/>
-          </a:xfrm>
-        </p:spPr>
-        <p:txBody>
-          <a:bodyPr/>
-          <a:lstStyle/>
-          <a:p>
-            <a:pPr algn="ctr"/>
-            <a:r>
-              <a:rPr lang="ru-RU" dirty="0"/>
-              <a:t>Высокая нагрузка</a:t>
-            </a:r>
-          </a:p>
-        </p:txBody>
-      </p:sp>
-      <p:sp>
-        <p:nvSpPr>
-          <p:cNvPr id="6" name="Объект 5">
-            <a:extLst>
-              <a:ext uri="{FF2B5EF4-FFF2-40B4-BE49-F238E27FC236}">
-                <a16:creationId xmlns:a16="http://schemas.microsoft.com/office/drawing/2014/main" id="{0EA1E164-C2B5-48C1-B193-DFAD00716195}"/>
-              </a:ext>
-            </a:extLst>
-          </p:cNvPr>
-          <p:cNvSpPr>
-            <a:spLocks noGrp="1"/>
-          </p:cNvSpPr>
-          <p:nvPr>
-            <p:ph sz="half" idx="2"/>
-          </p:nvPr>
-        </p:nvSpPr>
-        <p:spPr>
-          <a:xfrm>
-            <a:off x="6932367" y="1831329"/>
-            <a:ext cx="5181600" cy="4351338"/>
-          </a:xfrm>
-        </p:spPr>
-        <p:txBody>
-          <a:bodyPr/>
-          <a:lstStyle/>
-          <a:p>
-            <a:pPr algn="ctr"/>
-            <a:r>
-              <a:rPr lang="ru-RU" dirty="0"/>
-              <a:t>Низкая нагрузка</a:t>
-            </a:r>
-          </a:p>
-        </p:txBody>
-      </p:sp>
-      <p:sp>
-        <p:nvSpPr>
-          <p:cNvPr id="7" name="Прямоугольник 6">
-            <a:extLst>
-              <a:ext uri="{FF2B5EF4-FFF2-40B4-BE49-F238E27FC236}">
-                <a16:creationId xmlns:a16="http://schemas.microsoft.com/office/drawing/2014/main" id="{F6A40115-B26E-4331-A970-E087A4466FC9}"/>
-              </a:ext>
-            </a:extLst>
-          </p:cNvPr>
-          <p:cNvSpPr/>
-          <p:nvPr/>
-        </p:nvSpPr>
-        <p:spPr>
-          <a:xfrm>
-            <a:off x="1658694" y="3378809"/>
-            <a:ext cx="4772487" cy="1881273"/>
+            <a:off x="10115550" y="252413"/>
+            <a:ext cx="1438275" cy="1438275"/>
           </a:xfrm>
           <a:prstGeom prst="rect">
             <a:avLst/>
           </a:prstGeom>
         </p:spPr>
-        <p:style>
-          <a:lnRef idx="2">
-            <a:schemeClr val="accent1">
-              <a:shade val="50000"/>
-            </a:schemeClr>
-          </a:lnRef>
-          <a:fillRef idx="1">
-            <a:schemeClr val="accent1"/>
-          </a:fillRef>
-          <a:effectRef idx="0">
-            <a:schemeClr val="accent1"/>
-          </a:effectRef>
-          <a:fontRef idx="minor">
-            <a:schemeClr val="lt1"/>
-          </a:fontRef>
-        </p:style>
-        <p:txBody>
-          <a:bodyPr rtlCol="0" anchor="ctr"/>
-          <a:lstStyle/>
-          <a:p>
-            <a:pPr algn="ctr"/>
-            <a:endParaRPr lang="ru-RU" dirty="0"/>
-          </a:p>
-        </p:txBody>
-      </p:sp>
-      <p:sp>
-        <p:nvSpPr>
-          <p:cNvPr id="9" name="Прямоугольник 8">
-            <a:extLst>
-              <a:ext uri="{FF2B5EF4-FFF2-40B4-BE49-F238E27FC236}">
-                <a16:creationId xmlns:a16="http://schemas.microsoft.com/office/drawing/2014/main" id="{44555293-72CF-4D88-980C-43EE45B61177}"/>
-              </a:ext>
-            </a:extLst>
-          </p:cNvPr>
-          <p:cNvSpPr/>
-          <p:nvPr/>
-        </p:nvSpPr>
-        <p:spPr>
-          <a:xfrm>
-            <a:off x="1853888" y="3933266"/>
-            <a:ext cx="923278" cy="772358"/>
-          </a:xfrm>
-          <a:prstGeom prst="rect">
-            <a:avLst/>
-          </a:prstGeom>
-          <a:solidFill>
-            <a:schemeClr val="accent2"/>
-          </a:solidFill>
-        </p:spPr>
-        <p:style>
-          <a:lnRef idx="2">
-            <a:schemeClr val="accent1">
-              <a:shade val="50000"/>
-            </a:schemeClr>
-          </a:lnRef>
-          <a:fillRef idx="1">
-            <a:schemeClr val="accent1"/>
-          </a:fillRef>
-          <a:effectRef idx="0">
-            <a:schemeClr val="accent1"/>
-          </a:effectRef>
-          <a:fontRef idx="minor">
-            <a:schemeClr val="lt1"/>
-          </a:fontRef>
-        </p:style>
-        <p:txBody>
-          <a:bodyPr rtlCol="0" anchor="ctr"/>
-          <a:lstStyle/>
-          <a:p>
-            <a:pPr algn="ctr"/>
-            <a:r>
-              <a:rPr lang="ru-RU" dirty="0"/>
-              <a:t>1</a:t>
-            </a:r>
-          </a:p>
-        </p:txBody>
-      </p:sp>
-      <p:sp>
-        <p:nvSpPr>
-          <p:cNvPr id="10" name="Прямоугольник 9">
-            <a:extLst>
-              <a:ext uri="{FF2B5EF4-FFF2-40B4-BE49-F238E27FC236}">
-                <a16:creationId xmlns:a16="http://schemas.microsoft.com/office/drawing/2014/main" id="{CE5B02DE-6029-4398-9DA3-45A789A23974}"/>
-              </a:ext>
-            </a:extLst>
-          </p:cNvPr>
-          <p:cNvSpPr/>
-          <p:nvPr/>
-        </p:nvSpPr>
-        <p:spPr>
-          <a:xfrm>
-            <a:off x="2972359" y="3933266"/>
-            <a:ext cx="923278" cy="772358"/>
-          </a:xfrm>
-          <a:prstGeom prst="rect">
-            <a:avLst/>
-          </a:prstGeom>
-          <a:solidFill>
-            <a:schemeClr val="accent2"/>
-          </a:solidFill>
-        </p:spPr>
-        <p:style>
-          <a:lnRef idx="2">
-            <a:schemeClr val="accent1">
-              <a:shade val="50000"/>
-            </a:schemeClr>
-          </a:lnRef>
-          <a:fillRef idx="1">
-            <a:schemeClr val="accent1"/>
-          </a:fillRef>
-          <a:effectRef idx="0">
-            <a:schemeClr val="accent1"/>
-          </a:effectRef>
-          <a:fontRef idx="minor">
-            <a:schemeClr val="lt1"/>
-          </a:fontRef>
-        </p:style>
-        <p:txBody>
-          <a:bodyPr rtlCol="0" anchor="ctr"/>
-          <a:lstStyle/>
-          <a:p>
-            <a:pPr algn="ctr"/>
-            <a:r>
-              <a:rPr lang="ru-RU" dirty="0"/>
-              <a:t>2</a:t>
-            </a:r>
-          </a:p>
-        </p:txBody>
-      </p:sp>
-      <p:sp>
-        <p:nvSpPr>
-          <p:cNvPr id="11" name="Прямоугольник 10">
-            <a:extLst>
-              <a:ext uri="{FF2B5EF4-FFF2-40B4-BE49-F238E27FC236}">
-                <a16:creationId xmlns:a16="http://schemas.microsoft.com/office/drawing/2014/main" id="{999BFC55-4DFB-4B56-8C1B-0506399ABB3C}"/>
-              </a:ext>
-            </a:extLst>
-          </p:cNvPr>
-          <p:cNvSpPr/>
-          <p:nvPr/>
-        </p:nvSpPr>
-        <p:spPr>
-          <a:xfrm>
-            <a:off x="4140557" y="3933266"/>
-            <a:ext cx="923278" cy="772358"/>
-          </a:xfrm>
-          <a:prstGeom prst="rect">
-            <a:avLst/>
-          </a:prstGeom>
-          <a:solidFill>
-            <a:schemeClr val="accent2"/>
-          </a:solidFill>
-        </p:spPr>
-        <p:style>
-          <a:lnRef idx="2">
-            <a:schemeClr val="accent1">
-              <a:shade val="50000"/>
-            </a:schemeClr>
-          </a:lnRef>
-          <a:fillRef idx="1">
-            <a:schemeClr val="accent1"/>
-          </a:fillRef>
-          <a:effectRef idx="0">
-            <a:schemeClr val="accent1"/>
-          </a:effectRef>
-          <a:fontRef idx="minor">
-            <a:schemeClr val="lt1"/>
-          </a:fontRef>
-        </p:style>
-        <p:txBody>
-          <a:bodyPr rtlCol="0" anchor="ctr"/>
-          <a:lstStyle/>
-          <a:p>
-            <a:pPr algn="ctr"/>
-            <a:r>
-              <a:rPr lang="ru-RU" dirty="0"/>
-              <a:t>3</a:t>
-            </a:r>
-          </a:p>
-        </p:txBody>
-      </p:sp>
-      <p:sp>
-        <p:nvSpPr>
-          <p:cNvPr id="12" name="Прямоугольник 11">
-            <a:extLst>
-              <a:ext uri="{FF2B5EF4-FFF2-40B4-BE49-F238E27FC236}">
-                <a16:creationId xmlns:a16="http://schemas.microsoft.com/office/drawing/2014/main" id="{E2C043FA-6983-445D-8FEB-37D22BA2EE6F}"/>
-              </a:ext>
-            </a:extLst>
-          </p:cNvPr>
-          <p:cNvSpPr/>
-          <p:nvPr/>
-        </p:nvSpPr>
-        <p:spPr>
-          <a:xfrm>
-            <a:off x="5268391" y="3933266"/>
-            <a:ext cx="923278" cy="772358"/>
-          </a:xfrm>
-          <a:prstGeom prst="rect">
-            <a:avLst/>
-          </a:prstGeom>
-          <a:solidFill>
-            <a:schemeClr val="accent2"/>
-          </a:solidFill>
-        </p:spPr>
-        <p:style>
-          <a:lnRef idx="2">
-            <a:schemeClr val="accent1">
-              <a:shade val="50000"/>
-            </a:schemeClr>
-          </a:lnRef>
-          <a:fillRef idx="1">
-            <a:schemeClr val="accent1"/>
-          </a:fillRef>
-          <a:effectRef idx="0">
-            <a:schemeClr val="accent1"/>
-          </a:effectRef>
-          <a:fontRef idx="minor">
-            <a:schemeClr val="lt1"/>
-          </a:fontRef>
-        </p:style>
-        <p:txBody>
-          <a:bodyPr rtlCol="0" anchor="ctr"/>
-          <a:lstStyle/>
-          <a:p>
-            <a:pPr algn="ctr"/>
-            <a:r>
-              <a:rPr lang="ru-RU" dirty="0"/>
-              <a:t>4</a:t>
-            </a:r>
-          </a:p>
-        </p:txBody>
-      </p:sp>
-      <p:sp>
-        <p:nvSpPr>
-          <p:cNvPr id="14" name="Прямоугольник 13">
-            <a:extLst>
-              <a:ext uri="{FF2B5EF4-FFF2-40B4-BE49-F238E27FC236}">
-                <a16:creationId xmlns:a16="http://schemas.microsoft.com/office/drawing/2014/main" id="{45149A15-3FD1-43FB-8913-0C13564DEF99}"/>
-              </a:ext>
-            </a:extLst>
-          </p:cNvPr>
-          <p:cNvSpPr/>
-          <p:nvPr/>
-        </p:nvSpPr>
-        <p:spPr>
-          <a:xfrm>
-            <a:off x="7136924" y="3353379"/>
-            <a:ext cx="4772487" cy="1881273"/>
-          </a:xfrm>
-          <a:prstGeom prst="rect">
-            <a:avLst/>
-          </a:prstGeom>
-        </p:spPr>
-        <p:style>
-          <a:lnRef idx="2">
-            <a:schemeClr val="accent1">
-              <a:shade val="50000"/>
-            </a:schemeClr>
-          </a:lnRef>
-          <a:fillRef idx="1">
-            <a:schemeClr val="accent1"/>
-          </a:fillRef>
-          <a:effectRef idx="0">
-            <a:schemeClr val="accent1"/>
-          </a:effectRef>
-          <a:fontRef idx="minor">
-            <a:schemeClr val="lt1"/>
-          </a:fontRef>
-        </p:style>
-        <p:txBody>
-          <a:bodyPr rtlCol="0" anchor="ctr"/>
-          <a:lstStyle/>
-          <a:p>
-            <a:pPr algn="ctr"/>
-            <a:endParaRPr lang="ru-RU" dirty="0"/>
-          </a:p>
-        </p:txBody>
-      </p:sp>
-      <p:sp>
-        <p:nvSpPr>
-          <p:cNvPr id="17" name="Прямоугольник 16">
-            <a:extLst>
-              <a:ext uri="{FF2B5EF4-FFF2-40B4-BE49-F238E27FC236}">
-                <a16:creationId xmlns:a16="http://schemas.microsoft.com/office/drawing/2014/main" id="{E3395E2F-AF02-42E2-ACD5-AA66B0EE5D2C}"/>
-              </a:ext>
-            </a:extLst>
-          </p:cNvPr>
-          <p:cNvSpPr/>
-          <p:nvPr/>
-        </p:nvSpPr>
-        <p:spPr>
-          <a:xfrm>
-            <a:off x="7693463" y="3907836"/>
-            <a:ext cx="923278" cy="772358"/>
-          </a:xfrm>
-          <a:prstGeom prst="rect">
-            <a:avLst/>
-          </a:prstGeom>
-          <a:solidFill>
-            <a:schemeClr val="accent2"/>
-          </a:solidFill>
-        </p:spPr>
-        <p:style>
-          <a:lnRef idx="2">
-            <a:schemeClr val="accent1">
-              <a:shade val="50000"/>
-            </a:schemeClr>
-          </a:lnRef>
-          <a:fillRef idx="1">
-            <a:schemeClr val="accent1"/>
-          </a:fillRef>
-          <a:effectRef idx="0">
-            <a:schemeClr val="accent1"/>
-          </a:effectRef>
-          <a:fontRef idx="minor">
-            <a:schemeClr val="lt1"/>
-          </a:fontRef>
-        </p:style>
-        <p:txBody>
-          <a:bodyPr rtlCol="0" anchor="ctr"/>
-          <a:lstStyle/>
-          <a:p>
-            <a:pPr algn="ctr"/>
-            <a:r>
-              <a:rPr lang="ru-RU" dirty="0"/>
-              <a:t>1</a:t>
-            </a:r>
-          </a:p>
-        </p:txBody>
-      </p:sp>
-      <p:sp>
-        <p:nvSpPr>
-          <p:cNvPr id="18" name="Прямоугольник 17">
-            <a:extLst>
-              <a:ext uri="{FF2B5EF4-FFF2-40B4-BE49-F238E27FC236}">
-                <a16:creationId xmlns:a16="http://schemas.microsoft.com/office/drawing/2014/main" id="{2F8906C3-E031-42A8-A410-430C3322247D}"/>
-              </a:ext>
-            </a:extLst>
-          </p:cNvPr>
-          <p:cNvSpPr/>
-          <p:nvPr/>
-        </p:nvSpPr>
-        <p:spPr>
-          <a:xfrm>
-            <a:off x="10518714" y="3923055"/>
-            <a:ext cx="923278" cy="772358"/>
-          </a:xfrm>
-          <a:prstGeom prst="rect">
-            <a:avLst/>
-          </a:prstGeom>
-          <a:solidFill>
-            <a:schemeClr val="accent2"/>
-          </a:solidFill>
-        </p:spPr>
-        <p:style>
-          <a:lnRef idx="2">
-            <a:schemeClr val="accent1">
-              <a:shade val="50000"/>
-            </a:schemeClr>
-          </a:lnRef>
-          <a:fillRef idx="1">
-            <a:schemeClr val="accent1"/>
-          </a:fillRef>
-          <a:effectRef idx="0">
-            <a:schemeClr val="accent1"/>
-          </a:effectRef>
-          <a:fontRef idx="minor">
-            <a:schemeClr val="lt1"/>
-          </a:fontRef>
-        </p:style>
-        <p:txBody>
-          <a:bodyPr rtlCol="0" anchor="ctr"/>
-          <a:lstStyle/>
-          <a:p>
-            <a:pPr algn="ctr"/>
-            <a:r>
-              <a:rPr lang="ru-RU" dirty="0"/>
-              <a:t>2</a:t>
-            </a:r>
-          </a:p>
-        </p:txBody>
-      </p:sp>
-      <p:sp>
-        <p:nvSpPr>
-          <p:cNvPr id="19" name="Стрелка: вниз 18">
-            <a:extLst>
-              <a:ext uri="{FF2B5EF4-FFF2-40B4-BE49-F238E27FC236}">
-                <a16:creationId xmlns:a16="http://schemas.microsoft.com/office/drawing/2014/main" id="{02E66A67-E80A-48A5-91B2-A9084432D2C7}"/>
-              </a:ext>
-            </a:extLst>
-          </p:cNvPr>
-          <p:cNvSpPr/>
-          <p:nvPr/>
-        </p:nvSpPr>
-        <p:spPr>
-          <a:xfrm>
-            <a:off x="3617560" y="2419227"/>
-            <a:ext cx="854753" cy="959582"/>
-          </a:xfrm>
-          <a:prstGeom prst="downArrow">
-            <a:avLst/>
-          </a:prstGeom>
-        </p:spPr>
-        <p:style>
-          <a:lnRef idx="2">
-            <a:schemeClr val="accent1">
-              <a:shade val="50000"/>
-            </a:schemeClr>
-          </a:lnRef>
-          <a:fillRef idx="1">
-            <a:schemeClr val="accent1"/>
-          </a:fillRef>
-          <a:effectRef idx="0">
-            <a:schemeClr val="accent1"/>
-          </a:effectRef>
-          <a:fontRef idx="minor">
-            <a:schemeClr val="lt1"/>
-          </a:fontRef>
-        </p:style>
-        <p:txBody>
-          <a:bodyPr rtlCol="0" anchor="ctr"/>
-          <a:lstStyle/>
-          <a:p>
-            <a:pPr algn="ctr"/>
-            <a:endParaRPr lang="ru-RU"/>
-          </a:p>
-        </p:txBody>
-      </p:sp>
-      <p:sp>
-        <p:nvSpPr>
-          <p:cNvPr id="20" name="Стрелка: вниз 19">
-            <a:extLst>
-              <a:ext uri="{FF2B5EF4-FFF2-40B4-BE49-F238E27FC236}">
-                <a16:creationId xmlns:a16="http://schemas.microsoft.com/office/drawing/2014/main" id="{1B4DEC0C-BF30-4E95-9033-1BEBBA252D37}"/>
-              </a:ext>
-            </a:extLst>
-          </p:cNvPr>
-          <p:cNvSpPr/>
-          <p:nvPr/>
-        </p:nvSpPr>
-        <p:spPr>
-          <a:xfrm>
-            <a:off x="9095790" y="2393796"/>
-            <a:ext cx="854753" cy="959582"/>
-          </a:xfrm>
-          <a:prstGeom prst="downArrow">
-            <a:avLst/>
-          </a:prstGeom>
-        </p:spPr>
-        <p:style>
-          <a:lnRef idx="2">
-            <a:schemeClr val="accent1">
-              <a:shade val="50000"/>
-            </a:schemeClr>
-          </a:lnRef>
-          <a:fillRef idx="1">
-            <a:schemeClr val="accent1"/>
-          </a:fillRef>
-          <a:effectRef idx="0">
-            <a:schemeClr val="accent1"/>
-          </a:effectRef>
-          <a:fontRef idx="minor">
-            <a:schemeClr val="lt1"/>
-          </a:fontRef>
-        </p:style>
-        <p:txBody>
-          <a:bodyPr rtlCol="0" anchor="ctr"/>
-          <a:lstStyle/>
-          <a:p>
-            <a:pPr algn="ctr"/>
-            <a:endParaRPr lang="ru-RU" dirty="0"/>
-          </a:p>
-        </p:txBody>
-      </p:sp>
-      <p:cxnSp>
-        <p:nvCxnSpPr>
-          <p:cNvPr id="22" name="Прямая со стрелкой 21">
-            <a:extLst>
-              <a:ext uri="{FF2B5EF4-FFF2-40B4-BE49-F238E27FC236}">
-                <a16:creationId xmlns:a16="http://schemas.microsoft.com/office/drawing/2014/main" id="{5D878BB1-4021-4BE0-AE7F-83855CE29D20}"/>
-              </a:ext>
-            </a:extLst>
-          </p:cNvPr>
-          <p:cNvCxnSpPr>
-            <a:cxnSpLocks/>
-            <a:endCxn id="9" idx="0"/>
-          </p:cNvCxnSpPr>
-          <p:nvPr/>
-        </p:nvCxnSpPr>
-        <p:spPr>
-          <a:xfrm flipH="1">
-            <a:off x="2315527" y="3378808"/>
-            <a:ext cx="1729410" cy="554458"/>
-          </a:xfrm>
-          <a:prstGeom prst="straightConnector1">
-            <a:avLst/>
-          </a:prstGeom>
-          <a:ln w="57150">
-            <a:tailEnd type="triangle"/>
-          </a:ln>
-        </p:spPr>
-        <p:style>
-          <a:lnRef idx="3">
-            <a:schemeClr val="accent6"/>
-          </a:lnRef>
-          <a:fillRef idx="0">
-            <a:schemeClr val="accent6"/>
-          </a:fillRef>
-          <a:effectRef idx="2">
-            <a:schemeClr val="accent6"/>
-          </a:effectRef>
-          <a:fontRef idx="minor">
-            <a:schemeClr val="tx1"/>
-          </a:fontRef>
-        </p:style>
-      </p:cxnSp>
-      <p:cxnSp>
-        <p:nvCxnSpPr>
-          <p:cNvPr id="25" name="Прямая со стрелкой 24">
-            <a:extLst>
-              <a:ext uri="{FF2B5EF4-FFF2-40B4-BE49-F238E27FC236}">
-                <a16:creationId xmlns:a16="http://schemas.microsoft.com/office/drawing/2014/main" id="{0FD4F125-F284-4DA8-A649-5BE044829AE9}"/>
-              </a:ext>
-            </a:extLst>
-          </p:cNvPr>
-          <p:cNvCxnSpPr>
-            <a:stCxn id="19" idx="2"/>
-            <a:endCxn id="10" idx="0"/>
-          </p:cNvCxnSpPr>
-          <p:nvPr/>
-        </p:nvCxnSpPr>
-        <p:spPr>
-          <a:xfrm flipH="1">
-            <a:off x="3433998" y="3378809"/>
-            <a:ext cx="610939" cy="554457"/>
-          </a:xfrm>
-          <a:prstGeom prst="straightConnector1">
-            <a:avLst/>
-          </a:prstGeom>
-          <a:ln w="57150">
-            <a:tailEnd type="triangle"/>
-          </a:ln>
-        </p:spPr>
-        <p:style>
-          <a:lnRef idx="3">
-            <a:schemeClr val="accent6"/>
-          </a:lnRef>
-          <a:fillRef idx="0">
-            <a:schemeClr val="accent6"/>
-          </a:fillRef>
-          <a:effectRef idx="2">
-            <a:schemeClr val="accent6"/>
-          </a:effectRef>
-          <a:fontRef idx="minor">
-            <a:schemeClr val="tx1"/>
-          </a:fontRef>
-        </p:style>
-      </p:cxnSp>
-      <p:cxnSp>
-        <p:nvCxnSpPr>
-          <p:cNvPr id="26" name="Прямая со стрелкой 25">
-            <a:extLst>
-              <a:ext uri="{FF2B5EF4-FFF2-40B4-BE49-F238E27FC236}">
-                <a16:creationId xmlns:a16="http://schemas.microsoft.com/office/drawing/2014/main" id="{8B63C94A-9F9B-4913-9D42-FF9B2E94288B}"/>
-              </a:ext>
-            </a:extLst>
-          </p:cNvPr>
-          <p:cNvCxnSpPr>
-            <a:cxnSpLocks/>
-            <a:stCxn id="19" idx="2"/>
-            <a:endCxn id="11" idx="0"/>
-          </p:cNvCxnSpPr>
-          <p:nvPr/>
-        </p:nvCxnSpPr>
-        <p:spPr>
-          <a:xfrm>
-            <a:off x="4044937" y="3378809"/>
-            <a:ext cx="557259" cy="554457"/>
-          </a:xfrm>
-          <a:prstGeom prst="straightConnector1">
-            <a:avLst/>
-          </a:prstGeom>
-          <a:ln w="57150">
-            <a:tailEnd type="triangle"/>
-          </a:ln>
-        </p:spPr>
-        <p:style>
-          <a:lnRef idx="3">
-            <a:schemeClr val="accent6"/>
-          </a:lnRef>
-          <a:fillRef idx="0">
-            <a:schemeClr val="accent6"/>
-          </a:fillRef>
-          <a:effectRef idx="2">
-            <a:schemeClr val="accent6"/>
-          </a:effectRef>
-          <a:fontRef idx="minor">
-            <a:schemeClr val="tx1"/>
-          </a:fontRef>
-        </p:style>
-      </p:cxnSp>
-      <p:cxnSp>
-        <p:nvCxnSpPr>
-          <p:cNvPr id="29" name="Прямая со стрелкой 28">
-            <a:extLst>
-              <a:ext uri="{FF2B5EF4-FFF2-40B4-BE49-F238E27FC236}">
-                <a16:creationId xmlns:a16="http://schemas.microsoft.com/office/drawing/2014/main" id="{9FE559AF-9D01-412F-A1AE-6208AC611B15}"/>
-              </a:ext>
-            </a:extLst>
-          </p:cNvPr>
-          <p:cNvCxnSpPr>
-            <a:cxnSpLocks/>
-            <a:stCxn id="19" idx="2"/>
-            <a:endCxn id="12" idx="0"/>
-          </p:cNvCxnSpPr>
-          <p:nvPr/>
-        </p:nvCxnSpPr>
-        <p:spPr>
-          <a:xfrm>
-            <a:off x="4044937" y="3378809"/>
-            <a:ext cx="1685093" cy="554457"/>
-          </a:xfrm>
-          <a:prstGeom prst="straightConnector1">
-            <a:avLst/>
-          </a:prstGeom>
-          <a:ln w="57150">
-            <a:tailEnd type="triangle"/>
-          </a:ln>
-        </p:spPr>
-        <p:style>
-          <a:lnRef idx="3">
-            <a:schemeClr val="accent6"/>
-          </a:lnRef>
-          <a:fillRef idx="0">
-            <a:schemeClr val="accent6"/>
-          </a:fillRef>
-          <a:effectRef idx="2">
-            <a:schemeClr val="accent6"/>
-          </a:effectRef>
-          <a:fontRef idx="minor">
-            <a:schemeClr val="tx1"/>
-          </a:fontRef>
-        </p:style>
-      </p:cxnSp>
-      <p:sp>
-        <p:nvSpPr>
-          <p:cNvPr id="32" name="Стрелка: вниз 31">
-            <a:extLst>
-              <a:ext uri="{FF2B5EF4-FFF2-40B4-BE49-F238E27FC236}">
-                <a16:creationId xmlns:a16="http://schemas.microsoft.com/office/drawing/2014/main" id="{09D645A3-BFBC-47AA-AD57-760DB3F1A42F}"/>
-              </a:ext>
-            </a:extLst>
-          </p:cNvPr>
-          <p:cNvSpPr/>
-          <p:nvPr/>
-        </p:nvSpPr>
-        <p:spPr>
-          <a:xfrm>
-            <a:off x="3514993" y="5197815"/>
-            <a:ext cx="1059886" cy="1145219"/>
-          </a:xfrm>
-          <a:prstGeom prst="downArrow">
-            <a:avLst/>
-          </a:prstGeom>
-        </p:spPr>
-        <p:style>
-          <a:lnRef idx="2">
-            <a:schemeClr val="accent1">
-              <a:shade val="50000"/>
-            </a:schemeClr>
-          </a:lnRef>
-          <a:fillRef idx="1">
-            <a:schemeClr val="accent1"/>
-          </a:fillRef>
-          <a:effectRef idx="0">
-            <a:schemeClr val="accent1"/>
-          </a:effectRef>
-          <a:fontRef idx="minor">
-            <a:schemeClr val="lt1"/>
-          </a:fontRef>
-        </p:style>
-        <p:txBody>
-          <a:bodyPr rtlCol="0" anchor="ctr"/>
-          <a:lstStyle/>
-          <a:p>
-            <a:pPr algn="ctr"/>
-            <a:endParaRPr lang="ru-RU"/>
-          </a:p>
-        </p:txBody>
-      </p:sp>
-      <p:cxnSp>
-        <p:nvCxnSpPr>
-          <p:cNvPr id="34" name="Прямая со стрелкой 33">
-            <a:extLst>
-              <a:ext uri="{FF2B5EF4-FFF2-40B4-BE49-F238E27FC236}">
-                <a16:creationId xmlns:a16="http://schemas.microsoft.com/office/drawing/2014/main" id="{047E1301-194D-4E5B-8C2A-9CF49946EF2D}"/>
-              </a:ext>
-            </a:extLst>
-          </p:cNvPr>
-          <p:cNvCxnSpPr>
-            <a:stCxn id="9" idx="2"/>
-            <a:endCxn id="32" idx="0"/>
-          </p:cNvCxnSpPr>
-          <p:nvPr/>
-        </p:nvCxnSpPr>
-        <p:spPr>
-          <a:xfrm>
-            <a:off x="2315527" y="4705624"/>
-            <a:ext cx="1729409" cy="492191"/>
-          </a:xfrm>
-          <a:prstGeom prst="straightConnector1">
-            <a:avLst/>
-          </a:prstGeom>
-          <a:ln w="57150">
-            <a:solidFill>
-              <a:srgbClr val="FF0000"/>
-            </a:solidFill>
-            <a:tailEnd type="triangle"/>
-          </a:ln>
-        </p:spPr>
-        <p:style>
-          <a:lnRef idx="3">
-            <a:schemeClr val="accent6"/>
-          </a:lnRef>
-          <a:fillRef idx="0">
-            <a:schemeClr val="accent6"/>
-          </a:fillRef>
-          <a:effectRef idx="2">
-            <a:schemeClr val="accent6"/>
-          </a:effectRef>
-          <a:fontRef idx="minor">
-            <a:schemeClr val="tx1"/>
-          </a:fontRef>
-        </p:style>
-      </p:cxnSp>
-      <p:cxnSp>
-        <p:nvCxnSpPr>
-          <p:cNvPr id="35" name="Прямая со стрелкой 34">
-            <a:extLst>
-              <a:ext uri="{FF2B5EF4-FFF2-40B4-BE49-F238E27FC236}">
-                <a16:creationId xmlns:a16="http://schemas.microsoft.com/office/drawing/2014/main" id="{B83EFFCF-64A3-4D7B-8188-8870DBC4683F}"/>
-              </a:ext>
-            </a:extLst>
-          </p:cNvPr>
-          <p:cNvCxnSpPr>
-            <a:cxnSpLocks/>
-            <a:stCxn id="10" idx="2"/>
-            <a:endCxn id="32" idx="0"/>
-          </p:cNvCxnSpPr>
-          <p:nvPr/>
-        </p:nvCxnSpPr>
-        <p:spPr>
-          <a:xfrm>
-            <a:off x="3433998" y="4705624"/>
-            <a:ext cx="610938" cy="492191"/>
-          </a:xfrm>
-          <a:prstGeom prst="straightConnector1">
-            <a:avLst/>
-          </a:prstGeom>
-          <a:ln w="57150">
-            <a:solidFill>
-              <a:srgbClr val="FF0000"/>
-            </a:solidFill>
-            <a:tailEnd type="triangle"/>
-          </a:ln>
-        </p:spPr>
-        <p:style>
-          <a:lnRef idx="3">
-            <a:schemeClr val="accent6"/>
-          </a:lnRef>
-          <a:fillRef idx="0">
-            <a:schemeClr val="accent6"/>
-          </a:fillRef>
-          <a:effectRef idx="2">
-            <a:schemeClr val="accent6"/>
-          </a:effectRef>
-          <a:fontRef idx="minor">
-            <a:schemeClr val="tx1"/>
-          </a:fontRef>
-        </p:style>
-      </p:cxnSp>
-      <p:cxnSp>
-        <p:nvCxnSpPr>
-          <p:cNvPr id="39" name="Прямая со стрелкой 38">
-            <a:extLst>
-              <a:ext uri="{FF2B5EF4-FFF2-40B4-BE49-F238E27FC236}">
-                <a16:creationId xmlns:a16="http://schemas.microsoft.com/office/drawing/2014/main" id="{9E6FB51B-DA68-4271-B2DE-E597B2BF236D}"/>
-              </a:ext>
-            </a:extLst>
-          </p:cNvPr>
-          <p:cNvCxnSpPr>
-            <a:cxnSpLocks/>
-            <a:stCxn id="11" idx="2"/>
-            <a:endCxn id="32" idx="0"/>
-          </p:cNvCxnSpPr>
-          <p:nvPr/>
-        </p:nvCxnSpPr>
-        <p:spPr>
-          <a:xfrm flipH="1">
-            <a:off x="4044936" y="4705624"/>
-            <a:ext cx="557260" cy="492191"/>
-          </a:xfrm>
-          <a:prstGeom prst="straightConnector1">
-            <a:avLst/>
-          </a:prstGeom>
-          <a:ln w="57150">
-            <a:solidFill>
-              <a:srgbClr val="FF0000"/>
-            </a:solidFill>
-            <a:tailEnd type="triangle"/>
-          </a:ln>
-        </p:spPr>
-        <p:style>
-          <a:lnRef idx="3">
-            <a:schemeClr val="accent6"/>
-          </a:lnRef>
-          <a:fillRef idx="0">
-            <a:schemeClr val="accent6"/>
-          </a:fillRef>
-          <a:effectRef idx="2">
-            <a:schemeClr val="accent6"/>
-          </a:effectRef>
-          <a:fontRef idx="minor">
-            <a:schemeClr val="tx1"/>
-          </a:fontRef>
-        </p:style>
-      </p:cxnSp>
-      <p:cxnSp>
-        <p:nvCxnSpPr>
-          <p:cNvPr id="43" name="Прямая со стрелкой 42">
-            <a:extLst>
-              <a:ext uri="{FF2B5EF4-FFF2-40B4-BE49-F238E27FC236}">
-                <a16:creationId xmlns:a16="http://schemas.microsoft.com/office/drawing/2014/main" id="{5D61C790-77AA-4FC2-86E3-B4F4F3590B15}"/>
-              </a:ext>
-            </a:extLst>
-          </p:cNvPr>
-          <p:cNvCxnSpPr>
-            <a:cxnSpLocks/>
-            <a:stCxn id="12" idx="2"/>
-            <a:endCxn id="32" idx="0"/>
-          </p:cNvCxnSpPr>
-          <p:nvPr/>
-        </p:nvCxnSpPr>
-        <p:spPr>
-          <a:xfrm flipH="1">
-            <a:off x="4044936" y="4705624"/>
-            <a:ext cx="1685094" cy="492191"/>
-          </a:xfrm>
-          <a:prstGeom prst="straightConnector1">
-            <a:avLst/>
-          </a:prstGeom>
-          <a:ln w="57150">
-            <a:solidFill>
-              <a:srgbClr val="FF0000"/>
-            </a:solidFill>
-            <a:tailEnd type="triangle"/>
-          </a:ln>
-        </p:spPr>
-        <p:style>
-          <a:lnRef idx="3">
-            <a:schemeClr val="accent6"/>
-          </a:lnRef>
-          <a:fillRef idx="0">
-            <a:schemeClr val="accent6"/>
-          </a:fillRef>
-          <a:effectRef idx="2">
-            <a:schemeClr val="accent6"/>
-          </a:effectRef>
-          <a:fontRef idx="minor">
-            <a:schemeClr val="tx1"/>
-          </a:fontRef>
-        </p:style>
-      </p:cxnSp>
-      <p:sp>
-        <p:nvSpPr>
-          <p:cNvPr id="46" name="Стрелка: вниз 45">
-            <a:extLst>
-              <a:ext uri="{FF2B5EF4-FFF2-40B4-BE49-F238E27FC236}">
-                <a16:creationId xmlns:a16="http://schemas.microsoft.com/office/drawing/2014/main" id="{C07A5B39-E304-4084-A695-52A70E21ADF1}"/>
-              </a:ext>
-            </a:extLst>
-          </p:cNvPr>
-          <p:cNvSpPr/>
-          <p:nvPr/>
-        </p:nvSpPr>
-        <p:spPr>
-          <a:xfrm>
-            <a:off x="8993412" y="5172384"/>
-            <a:ext cx="1059886" cy="1145219"/>
-          </a:xfrm>
-          <a:prstGeom prst="downArrow">
-            <a:avLst/>
-          </a:prstGeom>
-        </p:spPr>
-        <p:style>
-          <a:lnRef idx="2">
-            <a:schemeClr val="accent1">
-              <a:shade val="50000"/>
-            </a:schemeClr>
-          </a:lnRef>
-          <a:fillRef idx="1">
-            <a:schemeClr val="accent1"/>
-          </a:fillRef>
-          <a:effectRef idx="0">
-            <a:schemeClr val="accent1"/>
-          </a:effectRef>
-          <a:fontRef idx="minor">
-            <a:schemeClr val="lt1"/>
-          </a:fontRef>
-        </p:style>
-        <p:txBody>
-          <a:bodyPr rtlCol="0" anchor="ctr"/>
-          <a:lstStyle/>
-          <a:p>
-            <a:pPr algn="ctr"/>
-            <a:endParaRPr lang="ru-RU"/>
-          </a:p>
-        </p:txBody>
-      </p:sp>
-      <p:cxnSp>
-        <p:nvCxnSpPr>
-          <p:cNvPr id="47" name="Прямая со стрелкой 46">
-            <a:extLst>
-              <a:ext uri="{FF2B5EF4-FFF2-40B4-BE49-F238E27FC236}">
-                <a16:creationId xmlns:a16="http://schemas.microsoft.com/office/drawing/2014/main" id="{30C8A367-6647-4935-B462-1361EAC27D97}"/>
-              </a:ext>
-            </a:extLst>
-          </p:cNvPr>
-          <p:cNvCxnSpPr>
-            <a:cxnSpLocks/>
-            <a:stCxn id="14" idx="0"/>
-            <a:endCxn id="17" idx="0"/>
-          </p:cNvCxnSpPr>
-          <p:nvPr/>
-        </p:nvCxnSpPr>
-        <p:spPr>
-          <a:xfrm flipH="1">
-            <a:off x="8155102" y="3353379"/>
-            <a:ext cx="1368066" cy="554457"/>
-          </a:xfrm>
-          <a:prstGeom prst="straightConnector1">
-            <a:avLst/>
-          </a:prstGeom>
-          <a:ln w="57150">
-            <a:tailEnd type="triangle"/>
-          </a:ln>
-        </p:spPr>
-        <p:style>
-          <a:lnRef idx="3">
-            <a:schemeClr val="accent6"/>
-          </a:lnRef>
-          <a:fillRef idx="0">
-            <a:schemeClr val="accent6"/>
-          </a:fillRef>
-          <a:effectRef idx="2">
-            <a:schemeClr val="accent6"/>
-          </a:effectRef>
-          <a:fontRef idx="minor">
-            <a:schemeClr val="tx1"/>
-          </a:fontRef>
-        </p:style>
-      </p:cxnSp>
-      <p:cxnSp>
-        <p:nvCxnSpPr>
-          <p:cNvPr id="50" name="Прямая со стрелкой 49">
-            <a:extLst>
-              <a:ext uri="{FF2B5EF4-FFF2-40B4-BE49-F238E27FC236}">
-                <a16:creationId xmlns:a16="http://schemas.microsoft.com/office/drawing/2014/main" id="{CF7B1CFE-A796-411D-96F2-66BED0500E2F}"/>
-              </a:ext>
-            </a:extLst>
-          </p:cNvPr>
-          <p:cNvCxnSpPr>
-            <a:cxnSpLocks/>
-            <a:stCxn id="20" idx="2"/>
-            <a:endCxn id="18" idx="0"/>
-          </p:cNvCxnSpPr>
-          <p:nvPr/>
-        </p:nvCxnSpPr>
-        <p:spPr>
-          <a:xfrm>
-            <a:off x="9523167" y="3353378"/>
-            <a:ext cx="1457186" cy="569677"/>
-          </a:xfrm>
-          <a:prstGeom prst="straightConnector1">
-            <a:avLst/>
-          </a:prstGeom>
-          <a:ln w="57150">
-            <a:tailEnd type="triangle"/>
-          </a:ln>
-        </p:spPr>
-        <p:style>
-          <a:lnRef idx="3">
-            <a:schemeClr val="accent6"/>
-          </a:lnRef>
-          <a:fillRef idx="0">
-            <a:schemeClr val="accent6"/>
-          </a:fillRef>
-          <a:effectRef idx="2">
-            <a:schemeClr val="accent6"/>
-          </a:effectRef>
-          <a:fontRef idx="minor">
-            <a:schemeClr val="tx1"/>
-          </a:fontRef>
-        </p:style>
-      </p:cxnSp>
-      <p:cxnSp>
-        <p:nvCxnSpPr>
-          <p:cNvPr id="54" name="Прямая со стрелкой 53">
-            <a:extLst>
-              <a:ext uri="{FF2B5EF4-FFF2-40B4-BE49-F238E27FC236}">
-                <a16:creationId xmlns:a16="http://schemas.microsoft.com/office/drawing/2014/main" id="{5E3CDC09-C740-4D90-8D46-65AD6AA6058D}"/>
-              </a:ext>
-            </a:extLst>
-          </p:cNvPr>
-          <p:cNvCxnSpPr>
-            <a:cxnSpLocks/>
-            <a:stCxn id="17" idx="2"/>
-            <a:endCxn id="46" idx="0"/>
-          </p:cNvCxnSpPr>
-          <p:nvPr/>
-        </p:nvCxnSpPr>
-        <p:spPr>
-          <a:xfrm>
-            <a:off x="8155102" y="4680194"/>
-            <a:ext cx="1368253" cy="492190"/>
-          </a:xfrm>
-          <a:prstGeom prst="straightConnector1">
-            <a:avLst/>
-          </a:prstGeom>
-          <a:ln w="57150">
-            <a:solidFill>
-              <a:srgbClr val="FF0000"/>
-            </a:solidFill>
-            <a:tailEnd type="triangle"/>
-          </a:ln>
-        </p:spPr>
-        <p:style>
-          <a:lnRef idx="3">
-            <a:schemeClr val="accent6"/>
-          </a:lnRef>
-          <a:fillRef idx="0">
-            <a:schemeClr val="accent6"/>
-          </a:fillRef>
-          <a:effectRef idx="2">
-            <a:schemeClr val="accent6"/>
-          </a:effectRef>
-          <a:fontRef idx="minor">
-            <a:schemeClr val="tx1"/>
-          </a:fontRef>
-        </p:style>
-      </p:cxnSp>
-      <p:cxnSp>
-        <p:nvCxnSpPr>
-          <p:cNvPr id="57" name="Прямая со стрелкой 56">
-            <a:extLst>
-              <a:ext uri="{FF2B5EF4-FFF2-40B4-BE49-F238E27FC236}">
-                <a16:creationId xmlns:a16="http://schemas.microsoft.com/office/drawing/2014/main" id="{226738E4-D538-4900-ABCD-9060B790BD19}"/>
-              </a:ext>
-            </a:extLst>
-          </p:cNvPr>
-          <p:cNvCxnSpPr>
-            <a:cxnSpLocks/>
-            <a:stCxn id="18" idx="2"/>
-            <a:endCxn id="46" idx="0"/>
-          </p:cNvCxnSpPr>
-          <p:nvPr/>
-        </p:nvCxnSpPr>
-        <p:spPr>
-          <a:xfrm flipH="1">
-            <a:off x="9523355" y="4695413"/>
-            <a:ext cx="1456998" cy="476971"/>
-          </a:xfrm>
-          <a:prstGeom prst="straightConnector1">
-            <a:avLst/>
-          </a:prstGeom>
-          <a:ln w="57150">
-            <a:solidFill>
-              <a:srgbClr val="FF0000"/>
-            </a:solidFill>
-            <a:tailEnd type="triangle"/>
-          </a:ln>
-        </p:spPr>
-        <p:style>
-          <a:lnRef idx="3">
-            <a:schemeClr val="accent6"/>
-          </a:lnRef>
-          <a:fillRef idx="0">
-            <a:schemeClr val="accent6"/>
-          </a:fillRef>
-          <a:effectRef idx="2">
-            <a:schemeClr val="accent6"/>
-          </a:effectRef>
-          <a:fontRef idx="minor">
-            <a:schemeClr val="tx1"/>
-          </a:fontRef>
-        </p:style>
-      </p:cxnSp>
-      <p:sp>
-        <p:nvSpPr>
-          <p:cNvPr id="61" name="TextBox 60">
-            <a:extLst>
-              <a:ext uri="{FF2B5EF4-FFF2-40B4-BE49-F238E27FC236}">
-                <a16:creationId xmlns:a16="http://schemas.microsoft.com/office/drawing/2014/main" id="{CCBBE0AF-C09D-43DF-87D3-143B2C61DEBA}"/>
-              </a:ext>
-            </a:extLst>
-          </p:cNvPr>
-          <p:cNvSpPr txBox="1"/>
-          <p:nvPr/>
-        </p:nvSpPr>
-        <p:spPr>
-          <a:xfrm>
-            <a:off x="248575" y="2752078"/>
-            <a:ext cx="2421047" cy="369332"/>
-          </a:xfrm>
-          <a:prstGeom prst="rect">
-            <a:avLst/>
-          </a:prstGeom>
-          <a:noFill/>
-        </p:spPr>
-        <p:txBody>
-          <a:bodyPr wrap="none" rtlCol="0">
-            <a:spAutoFit/>
-          </a:bodyPr>
-          <a:lstStyle/>
-          <a:p>
-            <a:r>
-              <a:rPr lang="ru-RU" dirty="0"/>
-              <a:t>Входной поток данных</a:t>
-            </a:r>
-          </a:p>
-        </p:txBody>
-      </p:sp>
-      <p:sp>
-        <p:nvSpPr>
-          <p:cNvPr id="62" name="TextBox 61">
-            <a:extLst>
-              <a:ext uri="{FF2B5EF4-FFF2-40B4-BE49-F238E27FC236}">
-                <a16:creationId xmlns:a16="http://schemas.microsoft.com/office/drawing/2014/main" id="{7C6A7A89-CBDE-4D39-95DE-9C9EEAA90A9D}"/>
-              </a:ext>
-            </a:extLst>
-          </p:cNvPr>
-          <p:cNvSpPr txBox="1"/>
-          <p:nvPr/>
-        </p:nvSpPr>
-        <p:spPr>
-          <a:xfrm>
-            <a:off x="248574" y="5838765"/>
-            <a:ext cx="2574936" cy="369332"/>
-          </a:xfrm>
-          <a:prstGeom prst="rect">
-            <a:avLst/>
-          </a:prstGeom>
-          <a:noFill/>
-        </p:spPr>
-        <p:txBody>
-          <a:bodyPr wrap="none" rtlCol="0">
-            <a:spAutoFit/>
-          </a:bodyPr>
-          <a:lstStyle/>
-          <a:p>
-            <a:r>
-              <a:rPr lang="ru-RU" dirty="0"/>
-              <a:t>Выходной поток данных</a:t>
-            </a:r>
-          </a:p>
-        </p:txBody>
-      </p:sp>
-      <p:sp>
-        <p:nvSpPr>
-          <p:cNvPr id="63" name="TextBox 62">
-            <a:extLst>
-              <a:ext uri="{FF2B5EF4-FFF2-40B4-BE49-F238E27FC236}">
-                <a16:creationId xmlns:a16="http://schemas.microsoft.com/office/drawing/2014/main" id="{B4A9520F-D588-4217-BC24-E65833C98CF3}"/>
-              </a:ext>
-            </a:extLst>
-          </p:cNvPr>
-          <p:cNvSpPr txBox="1"/>
-          <p:nvPr/>
-        </p:nvSpPr>
-        <p:spPr>
-          <a:xfrm>
-            <a:off x="248574" y="4109349"/>
-            <a:ext cx="1231876" cy="369332"/>
-          </a:xfrm>
-          <a:prstGeom prst="rect">
-            <a:avLst/>
-          </a:prstGeom>
-          <a:noFill/>
-        </p:spPr>
-        <p:txBody>
-          <a:bodyPr wrap="none" rtlCol="0">
-            <a:spAutoFit/>
-          </a:bodyPr>
-          <a:lstStyle/>
-          <a:p>
-            <a:r>
-              <a:rPr lang="ru-RU" dirty="0"/>
-              <a:t>Узлы РИВС</a:t>
-            </a:r>
-          </a:p>
-        </p:txBody>
-      </p:sp>
+      </p:pic>
     </p:spTree>
     <p:extLst>
       <p:ext uri="{BB962C8B-B14F-4D97-AF65-F5344CB8AC3E}">
-        <p14:creationId xmlns:p14="http://schemas.microsoft.com/office/powerpoint/2010/main" val="2969559686"/>
+        <p14:creationId xmlns:p14="http://schemas.microsoft.com/office/powerpoint/2010/main" val="2750793684"/>
       </p:ext>
     </p:extLst>
   </p:cSld>
@@ -6213,10 +6469,10 @@
       </p:grpSpPr>
       <p:sp>
         <p:nvSpPr>
-          <p:cNvPr id="2" name="Заголовок 1">
-            <a:extLst>
-              <a:ext uri="{FF2B5EF4-FFF2-40B4-BE49-F238E27FC236}">
-                <a16:creationId xmlns:a16="http://schemas.microsoft.com/office/drawing/2014/main" id="{D88DF4E3-A826-45F6-AEED-43A21C74A84D}"/>
+          <p:cNvPr id="4" name="Заголовок 3">
+            <a:extLst>
+              <a:ext uri="{FF2B5EF4-FFF2-40B4-BE49-F238E27FC236}">
+                <a16:creationId xmlns:a16="http://schemas.microsoft.com/office/drawing/2014/main" id="{68049E8F-F823-4CC3-8EE6-E4C351AB2F42}"/>
               </a:ext>
             </a:extLst>
           </p:cNvPr>
@@ -6227,168 +6483,73 @@
             <p:ph type="title"/>
           </p:nvPr>
         </p:nvSpPr>
-        <p:spPr/>
-        <p:txBody>
-          <a:bodyPr/>
-          <a:lstStyle/>
-          <a:p>
-            <a:r>
-              <a:rPr lang="ru-RU" dirty="0"/>
-              <a:t>Стек</a:t>
-            </a:r>
-          </a:p>
-        </p:txBody>
-      </p:sp>
-      <p:sp>
-        <p:nvSpPr>
-          <p:cNvPr id="3" name="Объект 2">
-            <a:extLst>
-              <a:ext uri="{FF2B5EF4-FFF2-40B4-BE49-F238E27FC236}">
-                <a16:creationId xmlns:a16="http://schemas.microsoft.com/office/drawing/2014/main" id="{5E77244A-50C3-4FD7-97A2-B5CE43B886A4}"/>
-              </a:ext>
-            </a:extLst>
-          </p:cNvPr>
-          <p:cNvSpPr>
-            <a:spLocks noGrp="1"/>
-          </p:cNvSpPr>
-          <p:nvPr>
-            <p:ph idx="1"/>
-          </p:nvPr>
-        </p:nvSpPr>
-        <p:spPr/>
-        <p:txBody>
-          <a:bodyPr/>
-          <a:lstStyle/>
-          <a:p>
-            <a:r>
-              <a:rPr lang="ru-RU" dirty="0"/>
-              <a:t>Язык программирования</a:t>
-            </a:r>
-            <a:r>
-              <a:rPr lang="en-US" dirty="0"/>
-              <a:t> Python3.1</a:t>
-            </a:r>
-            <a:r>
-              <a:rPr lang="ru-RU" dirty="0"/>
-              <a:t>2</a:t>
-            </a:r>
-            <a:r>
-              <a:rPr lang="en-US" dirty="0"/>
-              <a:t>;</a:t>
-            </a:r>
-            <a:endParaRPr lang="ru-RU" dirty="0"/>
-          </a:p>
-          <a:p>
-            <a:r>
-              <a:rPr lang="ru-RU" dirty="0"/>
-              <a:t>Облачная платформа</a:t>
-            </a:r>
-            <a:r>
-              <a:rPr lang="en-US" dirty="0"/>
-              <a:t> Yandex Cloud;</a:t>
-            </a:r>
-            <a:endParaRPr lang="ru-RU" i="1" dirty="0">
-              <a:highlight>
-                <a:srgbClr val="FFFF00"/>
-              </a:highlight>
-            </a:endParaRPr>
-          </a:p>
-          <a:p>
-            <a:r>
-              <a:rPr lang="en-US" dirty="0"/>
-              <a:t>Kubernetes; </a:t>
-            </a:r>
-          </a:p>
-          <a:p>
-            <a:r>
-              <a:rPr lang="en-US" dirty="0"/>
-              <a:t>Docker;</a:t>
-            </a:r>
-          </a:p>
-          <a:p>
-            <a:r>
-              <a:rPr lang="en-US" dirty="0"/>
-              <a:t>Prometheus.</a:t>
-            </a:r>
-          </a:p>
-          <a:p>
-            <a:r>
-              <a:rPr lang="en-US" dirty="0"/>
-              <a:t>MUI;</a:t>
-            </a:r>
-          </a:p>
-          <a:p>
-            <a:r>
-              <a:rPr lang="en-US" dirty="0" err="1"/>
-              <a:t>NextJS</a:t>
-            </a:r>
-            <a:r>
-              <a:rPr lang="en-US" dirty="0"/>
-              <a:t>;</a:t>
-            </a:r>
-          </a:p>
-          <a:p>
-            <a:r>
-              <a:rPr lang="en-US" dirty="0"/>
-              <a:t>Nginx.</a:t>
-            </a:r>
-          </a:p>
-          <a:p>
-            <a:endParaRPr lang="ru-RU" dirty="0"/>
-          </a:p>
-        </p:txBody>
-      </p:sp>
-      <p:sp>
-        <p:nvSpPr>
-          <p:cNvPr id="4" name="AutoShape 2" descr="File:C-sharplogo">
-            <a:extLst>
-              <a:ext uri="{FF2B5EF4-FFF2-40B4-BE49-F238E27FC236}">
-                <a16:creationId xmlns:a16="http://schemas.microsoft.com/office/drawing/2014/main" id="{194C774E-43FC-72E0-5533-B97429DE84DD}"/>
-              </a:ext>
-            </a:extLst>
-          </p:cNvPr>
-          <p:cNvSpPr>
-            <a:spLocks noChangeAspect="1" noChangeArrowheads="1"/>
-          </p:cNvSpPr>
-          <p:nvPr/>
-        </p:nvSpPr>
-        <p:spPr bwMode="auto">
+        <p:spPr>
           <a:xfrm>
-            <a:off x="5943600" y="3276600"/>
-            <a:ext cx="304800" cy="304800"/>
+            <a:off x="436041" y="279471"/>
+            <a:ext cx="10515600" cy="1325563"/>
           </a:xfrm>
-          <a:prstGeom prst="rect">
-            <a:avLst/>
-          </a:prstGeom>
-          <a:noFill/>
-          <a:extLst>
-            <a:ext uri="{909E8E84-426E-40DD-AFC4-6F175D3DCCD1}">
-              <a14:hiddenFill xmlns:a14="http://schemas.microsoft.com/office/drawing/2010/main">
-                <a:solidFill>
-                  <a:srgbClr val="FFFFFF"/>
-                </a:solidFill>
-              </a14:hiddenFill>
-            </a:ext>
-          </a:extLst>
         </p:spPr>
         <p:txBody>
-          <a:bodyPr vert="horz" wrap="square" lIns="91440" tIns="45720" rIns="91440" bIns="45720" numCol="1" anchor="t" anchorCtr="0" compatLnSpc="1">
-            <a:prstTxWarp prst="textNoShape">
-              <a:avLst/>
-            </a:prstTxWarp>
+          <a:bodyPr>
+            <a:normAutofit/>
           </a:bodyPr>
           <a:lstStyle/>
           <a:p>
-            <a:endParaRPr lang="ru-RU"/>
+            <a:r>
+              <a:rPr lang="ru-RU" sz="4000" dirty="0"/>
+              <a:t>Графическая иллюстрация</a:t>
+            </a:r>
+            <a:br>
+              <a:rPr lang="ru-RU" sz="4000" dirty="0"/>
+            </a:br>
+            <a:r>
+              <a:rPr lang="ru-RU" sz="4000" dirty="0"/>
+              <a:t>горизонтального масштабирования</a:t>
+            </a:r>
           </a:p>
         </p:txBody>
       </p:sp>
       <p:pic>
         <p:nvPicPr>
-          <p:cNvPr id="12" name="Рисунок 11">
-            <a:extLst>
-              <a:ext uri="{FF2B5EF4-FFF2-40B4-BE49-F238E27FC236}">
-                <a16:creationId xmlns:a16="http://schemas.microsoft.com/office/drawing/2014/main" id="{1D71AA61-93EE-6FB1-D4DA-18B3E43EC650}"/>
+          <p:cNvPr id="27" name="Объект 26">
+            <a:extLst>
+              <a:ext uri="{FF2B5EF4-FFF2-40B4-BE49-F238E27FC236}">
+                <a16:creationId xmlns:a16="http://schemas.microsoft.com/office/drawing/2014/main" id="{1F075694-75E0-541A-9A11-07BC22F0F839}"/>
+              </a:ext>
+            </a:extLst>
+          </p:cNvPr>
+          <p:cNvPicPr>
+            <a:picLocks noGrp="1" noChangeAspect="1"/>
+          </p:cNvPicPr>
+          <p:nvPr>
+            <p:ph sz="half" idx="1"/>
+          </p:nvPr>
+        </p:nvPicPr>
+        <p:blipFill>
+          <a:blip r:embed="rId2">
+            <a:extLst>
+              <a:ext uri="{28A0092B-C50C-407E-A947-70E740481C1C}">
+                <a14:useLocalDpi xmlns:a14="http://schemas.microsoft.com/office/drawing/2010/main" val="0"/>
+              </a:ext>
+            </a:extLst>
+          </a:blip>
+          <a:stretch>
+            <a:fillRect/>
+          </a:stretch>
+        </p:blipFill>
+        <p:spPr>
+          <a:xfrm>
+            <a:off x="2219254" y="1955800"/>
+            <a:ext cx="4810196" cy="4532313"/>
+          </a:xfrm>
+        </p:spPr>
+      </p:pic>
+      <p:pic>
+        <p:nvPicPr>
+          <p:cNvPr id="30" name="Рисунок 29">
+            <a:extLst>
+              <a:ext uri="{FF2B5EF4-FFF2-40B4-BE49-F238E27FC236}">
+                <a16:creationId xmlns:a16="http://schemas.microsoft.com/office/drawing/2014/main" id="{D9AE4102-45D9-2E90-3AA9-AA8A03230874}"/>
               </a:ext>
             </a:extLst>
           </p:cNvPr>
@@ -6414,281 +6575,8 @@
         </p:blipFill>
         <p:spPr>
           <a:xfrm>
-            <a:off x="7077173" y="2359716"/>
-            <a:ext cx="3286027" cy="491369"/>
-          </a:xfrm>
-          <a:prstGeom prst="rect">
-            <a:avLst/>
-          </a:prstGeom>
-        </p:spPr>
-      </p:pic>
-      <p:pic>
-        <p:nvPicPr>
-          <p:cNvPr id="9" name="Рисунок 8">
-            <a:extLst>
-              <a:ext uri="{FF2B5EF4-FFF2-40B4-BE49-F238E27FC236}">
-                <a16:creationId xmlns:a16="http://schemas.microsoft.com/office/drawing/2014/main" id="{4CEF2C5C-DB14-8E1C-3465-E44B3661EB62}"/>
-              </a:ext>
-            </a:extLst>
-          </p:cNvPr>
-          <p:cNvPicPr>
-            <a:picLocks noChangeAspect="1"/>
-          </p:cNvPicPr>
-          <p:nvPr/>
-        </p:nvPicPr>
-        <p:blipFill>
-          <a:blip r:embed="rId5">
-            <a:extLst>
-              <a:ext uri="{28A0092B-C50C-407E-A947-70E740481C1C}">
-                <a14:useLocalDpi xmlns:a14="http://schemas.microsoft.com/office/drawing/2010/main" val="0"/>
-              </a:ext>
-              <a:ext uri="{96DAC541-7B7A-43D3-8B79-37D633B846F1}">
-                <asvg:svgBlip xmlns:asvg="http://schemas.microsoft.com/office/drawing/2016/SVG/main" r:embed="rId6"/>
-              </a:ext>
-            </a:extLst>
-          </a:blip>
-          <a:stretch>
-            <a:fillRect/>
-          </a:stretch>
-        </p:blipFill>
-        <p:spPr>
-          <a:xfrm>
-            <a:off x="7077173" y="1891107"/>
-            <a:ext cx="403127" cy="403127"/>
-          </a:xfrm>
-          <a:prstGeom prst="rect">
-            <a:avLst/>
-          </a:prstGeom>
-        </p:spPr>
-      </p:pic>
-      <p:pic>
-        <p:nvPicPr>
-          <p:cNvPr id="11" name="Рисунок 10">
-            <a:extLst>
-              <a:ext uri="{FF2B5EF4-FFF2-40B4-BE49-F238E27FC236}">
-                <a16:creationId xmlns:a16="http://schemas.microsoft.com/office/drawing/2014/main" id="{4DC66C89-5063-5431-0B27-F887373095BB}"/>
-              </a:ext>
-            </a:extLst>
-          </p:cNvPr>
-          <p:cNvPicPr>
-            <a:picLocks noChangeAspect="1"/>
-          </p:cNvPicPr>
-          <p:nvPr/>
-        </p:nvPicPr>
-        <p:blipFill>
-          <a:blip r:embed="rId7">
-            <a:extLst>
-              <a:ext uri="{28A0092B-C50C-407E-A947-70E740481C1C}">
-                <a14:useLocalDpi xmlns:a14="http://schemas.microsoft.com/office/drawing/2010/main" val="0"/>
-              </a:ext>
-              <a:ext uri="{96DAC541-7B7A-43D3-8B79-37D633B846F1}">
-                <asvg:svgBlip xmlns:asvg="http://schemas.microsoft.com/office/drawing/2016/SVG/main" r:embed="rId8"/>
-              </a:ext>
-            </a:extLst>
-          </a:blip>
-          <a:stretch>
-            <a:fillRect/>
-          </a:stretch>
-        </p:blipFill>
-        <p:spPr>
-          <a:xfrm>
-            <a:off x="7088334" y="2916567"/>
-            <a:ext cx="403127" cy="403127"/>
-          </a:xfrm>
-          <a:prstGeom prst="rect">
-            <a:avLst/>
-          </a:prstGeom>
-        </p:spPr>
-      </p:pic>
-      <p:pic>
-        <p:nvPicPr>
-          <p:cNvPr id="15" name="Рисунок 14">
-            <a:extLst>
-              <a:ext uri="{FF2B5EF4-FFF2-40B4-BE49-F238E27FC236}">
-                <a16:creationId xmlns:a16="http://schemas.microsoft.com/office/drawing/2014/main" id="{7B4A03FE-B6E4-D0D0-10D5-23FD2F5FB59F}"/>
-              </a:ext>
-            </a:extLst>
-          </p:cNvPr>
-          <p:cNvPicPr>
-            <a:picLocks noChangeAspect="1"/>
-          </p:cNvPicPr>
-          <p:nvPr/>
-        </p:nvPicPr>
-        <p:blipFill>
-          <a:blip r:embed="rId9">
-            <a:extLst>
-              <a:ext uri="{28A0092B-C50C-407E-A947-70E740481C1C}">
-                <a14:useLocalDpi xmlns:a14="http://schemas.microsoft.com/office/drawing/2010/main" val="0"/>
-              </a:ext>
-              <a:ext uri="{96DAC541-7B7A-43D3-8B79-37D633B846F1}">
-                <asvg:svgBlip xmlns:asvg="http://schemas.microsoft.com/office/drawing/2016/SVG/main" r:embed="rId10"/>
-              </a:ext>
-            </a:extLst>
-          </a:blip>
-          <a:stretch>
-            <a:fillRect/>
-          </a:stretch>
-        </p:blipFill>
-        <p:spPr>
-          <a:xfrm>
-            <a:off x="7077173" y="4937574"/>
-            <a:ext cx="403127" cy="403127"/>
-          </a:xfrm>
-          <a:prstGeom prst="rect">
-            <a:avLst/>
-          </a:prstGeom>
-        </p:spPr>
-      </p:pic>
-      <p:pic>
-        <p:nvPicPr>
-          <p:cNvPr id="17" name="Рисунок 16">
-            <a:extLst>
-              <a:ext uri="{FF2B5EF4-FFF2-40B4-BE49-F238E27FC236}">
-                <a16:creationId xmlns:a16="http://schemas.microsoft.com/office/drawing/2014/main" id="{B079D645-29E9-2972-5A74-C913EB28C6AC}"/>
-              </a:ext>
-            </a:extLst>
-          </p:cNvPr>
-          <p:cNvPicPr>
-            <a:picLocks noChangeAspect="1"/>
-          </p:cNvPicPr>
-          <p:nvPr/>
-        </p:nvPicPr>
-        <p:blipFill>
-          <a:blip r:embed="rId11">
-            <a:extLst>
-              <a:ext uri="{28A0092B-C50C-407E-A947-70E740481C1C}">
-                <a14:useLocalDpi xmlns:a14="http://schemas.microsoft.com/office/drawing/2010/main" val="0"/>
-              </a:ext>
-              <a:ext uri="{96DAC541-7B7A-43D3-8B79-37D633B846F1}">
-                <asvg:svgBlip xmlns:asvg="http://schemas.microsoft.com/office/drawing/2016/SVG/main" r:embed="rId12"/>
-              </a:ext>
-            </a:extLst>
-          </a:blip>
-          <a:stretch>
-            <a:fillRect/>
-          </a:stretch>
-        </p:blipFill>
-        <p:spPr>
-          <a:xfrm>
-            <a:off x="7088333" y="3881314"/>
-            <a:ext cx="391967" cy="391967"/>
-          </a:xfrm>
-          <a:prstGeom prst="rect">
-            <a:avLst/>
-          </a:prstGeom>
-        </p:spPr>
-      </p:pic>
-      <p:pic>
-        <p:nvPicPr>
-          <p:cNvPr id="19" name="Рисунок 18">
-            <a:extLst>
-              <a:ext uri="{FF2B5EF4-FFF2-40B4-BE49-F238E27FC236}">
-                <a16:creationId xmlns:a16="http://schemas.microsoft.com/office/drawing/2014/main" id="{10E59A1E-B21E-F900-0B80-2DB3DE372DC5}"/>
-              </a:ext>
-            </a:extLst>
-          </p:cNvPr>
-          <p:cNvPicPr>
-            <a:picLocks noChangeAspect="1"/>
-          </p:cNvPicPr>
-          <p:nvPr/>
-        </p:nvPicPr>
-        <p:blipFill>
-          <a:blip r:embed="rId13">
-            <a:extLst>
-              <a:ext uri="{28A0092B-C50C-407E-A947-70E740481C1C}">
-                <a14:useLocalDpi xmlns:a14="http://schemas.microsoft.com/office/drawing/2010/main" val="0"/>
-              </a:ext>
-              <a:ext uri="{96DAC541-7B7A-43D3-8B79-37D633B846F1}">
-                <asvg:svgBlip xmlns:asvg="http://schemas.microsoft.com/office/drawing/2016/SVG/main" r:embed="rId14"/>
-              </a:ext>
-            </a:extLst>
-          </a:blip>
-          <a:stretch>
-            <a:fillRect/>
-          </a:stretch>
-        </p:blipFill>
-        <p:spPr>
-          <a:xfrm>
-            <a:off x="7088333" y="3398940"/>
-            <a:ext cx="403128" cy="403128"/>
-          </a:xfrm>
-          <a:prstGeom prst="rect">
-            <a:avLst/>
-          </a:prstGeom>
-        </p:spPr>
-      </p:pic>
-      <p:pic>
-        <p:nvPicPr>
-          <p:cNvPr id="21" name="Рисунок 20">
-            <a:extLst>
-              <a:ext uri="{FF2B5EF4-FFF2-40B4-BE49-F238E27FC236}">
-                <a16:creationId xmlns:a16="http://schemas.microsoft.com/office/drawing/2014/main" id="{941E23F6-9BAB-6FCB-4806-8D05FEC594A1}"/>
-              </a:ext>
-            </a:extLst>
-          </p:cNvPr>
-          <p:cNvPicPr>
-            <a:picLocks noChangeAspect="1"/>
-          </p:cNvPicPr>
-          <p:nvPr/>
-        </p:nvPicPr>
-        <p:blipFill>
-          <a:blip r:embed="rId15">
-            <a:extLst>
-              <a:ext uri="{28A0092B-C50C-407E-A947-70E740481C1C}">
-                <a14:useLocalDpi xmlns:a14="http://schemas.microsoft.com/office/drawing/2010/main" val="0"/>
-              </a:ext>
-              <a:ext uri="{96DAC541-7B7A-43D3-8B79-37D633B846F1}">
-                <asvg:svgBlip xmlns:asvg="http://schemas.microsoft.com/office/drawing/2016/SVG/main" r:embed="rId16"/>
-              </a:ext>
-            </a:extLst>
-          </a:blip>
-          <a:stretch>
-            <a:fillRect/>
-          </a:stretch>
-        </p:blipFill>
-        <p:spPr>
-          <a:xfrm>
-            <a:off x="7088333" y="4386270"/>
-            <a:ext cx="439689" cy="439689"/>
-          </a:xfrm>
-          <a:prstGeom prst="rect">
-            <a:avLst/>
-          </a:prstGeom>
-        </p:spPr>
-      </p:pic>
-      <p:pic>
-        <p:nvPicPr>
-          <p:cNvPr id="25" name="Рисунок 24">
-            <a:extLst>
-              <a:ext uri="{FF2B5EF4-FFF2-40B4-BE49-F238E27FC236}">
-                <a16:creationId xmlns:a16="http://schemas.microsoft.com/office/drawing/2014/main" id="{FB4B29B2-AFC8-8CCD-0926-D6001206F364}"/>
-              </a:ext>
-            </a:extLst>
-          </p:cNvPr>
-          <p:cNvPicPr>
-            <a:picLocks noChangeAspect="1"/>
-          </p:cNvPicPr>
-          <p:nvPr/>
-        </p:nvPicPr>
-        <p:blipFill>
-          <a:blip r:embed="rId17">
-            <a:extLst>
-              <a:ext uri="{28A0092B-C50C-407E-A947-70E740481C1C}">
-                <a14:useLocalDpi xmlns:a14="http://schemas.microsoft.com/office/drawing/2010/main" val="0"/>
-              </a:ext>
-              <a:ext uri="{96DAC541-7B7A-43D3-8B79-37D633B846F1}">
-                <asvg:svgBlip xmlns:asvg="http://schemas.microsoft.com/office/drawing/2016/SVG/main" r:embed="rId18"/>
-              </a:ext>
-            </a:extLst>
-          </a:blip>
-          <a:stretch>
-            <a:fillRect/>
-          </a:stretch>
-        </p:blipFill>
-        <p:spPr>
-          <a:xfrm>
-            <a:off x="7088334" y="5478680"/>
-            <a:ext cx="403127" cy="403127"/>
+            <a:off x="10091216" y="285300"/>
+            <a:ext cx="1319734" cy="1319734"/>
           </a:xfrm>
           <a:prstGeom prst="rect">
             <a:avLst/>
@@ -6698,7 +6586,7 @@
     </p:spTree>
     <p:extLst>
       <p:ext uri="{BB962C8B-B14F-4D97-AF65-F5344CB8AC3E}">
-        <p14:creationId xmlns:p14="http://schemas.microsoft.com/office/powerpoint/2010/main" val="3208699259"/>
+        <p14:creationId xmlns:p14="http://schemas.microsoft.com/office/powerpoint/2010/main" val="2969559686"/>
       </p:ext>
     </p:extLst>
   </p:cSld>

</xml_diff>